<commit_message>
METHOD_BASE_AUTHENTICATION: switched to method base authentication by using annotation
</commit_message>
<xml_diff>
--- a/Spring boot.pptx
+++ b/Spring boot.pptx
@@ -9,6 +9,10 @@
     <p:sldId id="257" r:id="rId3"/>
     <p:sldId id="258" r:id="rId4"/>
     <p:sldId id="259" r:id="rId5"/>
+    <p:sldId id="260" r:id="rId6"/>
+    <p:sldId id="263" r:id="rId7"/>
+    <p:sldId id="262" r:id="rId8"/>
+    <p:sldId id="261" r:id="rId9"/>
   </p:sldIdLst>
   <p:sldSz cx="12192000" cy="6858000"/>
   <p:notesSz cx="6858000" cy="9144000"/>
@@ -107,7 +111,2438 @@
       </a:defRPr>
     </a:lvl9pPr>
   </p:defaultTextStyle>
+  <p:extLst>
+    <p:ext uri="{EFAFB233-063F-42B5-8137-9DF3F51BA10A}">
+      <p15:sldGuideLst xmlns:p15="http://schemas.microsoft.com/office/powerpoint/2012/main"/>
+    </p:ext>
+  </p:extLst>
 </p:presentation>
+</file>
+
+<file path=ppt/diagrams/colors1.xml><?xml version="1.0" encoding="utf-8"?>
+<dgm:colorsDef xmlns:dgm="http://schemas.openxmlformats.org/drawingml/2006/diagram" xmlns:a="http://schemas.openxmlformats.org/drawingml/2006/main" uniqueId="urn:microsoft.com/office/officeart/2005/8/colors/colorful2">
+  <dgm:title val=""/>
+  <dgm:desc val=""/>
+  <dgm:catLst>
+    <dgm:cat type="colorful" pri="10200"/>
+  </dgm:catLst>
+  <dgm:styleLbl name="node0">
+    <dgm:fillClrLst meth="repeat">
+      <a:schemeClr val="accent1"/>
+    </dgm:fillClrLst>
+    <dgm:linClrLst meth="repeat">
+      <a:schemeClr val="lt1"/>
+    </dgm:linClrLst>
+    <dgm:effectClrLst/>
+    <dgm:txLinClrLst/>
+    <dgm:txFillClrLst/>
+    <dgm:txEffectClrLst/>
+  </dgm:styleLbl>
+  <dgm:styleLbl name="node1">
+    <dgm:fillClrLst>
+      <a:schemeClr val="accent2"/>
+      <a:schemeClr val="accent3"/>
+    </dgm:fillClrLst>
+    <dgm:linClrLst meth="repeat">
+      <a:schemeClr val="lt1"/>
+    </dgm:linClrLst>
+    <dgm:effectClrLst/>
+    <dgm:txLinClrLst/>
+    <dgm:txFillClrLst/>
+    <dgm:txEffectClrLst/>
+  </dgm:styleLbl>
+  <dgm:styleLbl name="alignNode1">
+    <dgm:fillClrLst>
+      <a:schemeClr val="accent2"/>
+      <a:schemeClr val="accent3"/>
+    </dgm:fillClrLst>
+    <dgm:linClrLst>
+      <a:schemeClr val="accent2"/>
+      <a:schemeClr val="accent3"/>
+    </dgm:linClrLst>
+    <dgm:effectClrLst/>
+    <dgm:txLinClrLst/>
+    <dgm:txFillClrLst/>
+    <dgm:txEffectClrLst/>
+  </dgm:styleLbl>
+  <dgm:styleLbl name="lnNode1">
+    <dgm:fillClrLst>
+      <a:schemeClr val="accent2"/>
+      <a:schemeClr val="accent3"/>
+    </dgm:fillClrLst>
+    <dgm:linClrLst meth="repeat">
+      <a:schemeClr val="lt1"/>
+    </dgm:linClrLst>
+    <dgm:effectClrLst/>
+    <dgm:txLinClrLst/>
+    <dgm:txFillClrLst/>
+    <dgm:txEffectClrLst/>
+  </dgm:styleLbl>
+  <dgm:styleLbl name="vennNode1">
+    <dgm:fillClrLst>
+      <a:schemeClr val="accent2">
+        <a:alpha val="50000"/>
+      </a:schemeClr>
+      <a:schemeClr val="accent3">
+        <a:alpha val="50000"/>
+      </a:schemeClr>
+    </dgm:fillClrLst>
+    <dgm:linClrLst meth="repeat">
+      <a:schemeClr val="lt1"/>
+    </dgm:linClrLst>
+    <dgm:effectClrLst/>
+    <dgm:txLinClrLst/>
+    <dgm:txFillClrLst/>
+    <dgm:txEffectClrLst/>
+  </dgm:styleLbl>
+  <dgm:styleLbl name="node2">
+    <dgm:fillClrLst>
+      <a:schemeClr val="accent3"/>
+    </dgm:fillClrLst>
+    <dgm:linClrLst meth="repeat">
+      <a:schemeClr val="lt1"/>
+    </dgm:linClrLst>
+    <dgm:effectClrLst/>
+    <dgm:txLinClrLst/>
+    <dgm:txFillClrLst/>
+    <dgm:txEffectClrLst/>
+  </dgm:styleLbl>
+  <dgm:styleLbl name="node3">
+    <dgm:fillClrLst>
+      <a:schemeClr val="accent4"/>
+    </dgm:fillClrLst>
+    <dgm:linClrLst meth="repeat">
+      <a:schemeClr val="lt1"/>
+    </dgm:linClrLst>
+    <dgm:effectClrLst/>
+    <dgm:txLinClrLst/>
+    <dgm:txFillClrLst/>
+    <dgm:txEffectClrLst/>
+  </dgm:styleLbl>
+  <dgm:styleLbl name="node4">
+    <dgm:fillClrLst>
+      <a:schemeClr val="accent5"/>
+    </dgm:fillClrLst>
+    <dgm:linClrLst meth="repeat">
+      <a:schemeClr val="lt1"/>
+    </dgm:linClrLst>
+    <dgm:effectClrLst/>
+    <dgm:txLinClrLst/>
+    <dgm:txFillClrLst/>
+    <dgm:txEffectClrLst/>
+  </dgm:styleLbl>
+  <dgm:styleLbl name="fgImgPlace1">
+    <dgm:fillClrLst>
+      <a:schemeClr val="accent2">
+        <a:tint val="50000"/>
+      </a:schemeClr>
+      <a:schemeClr val="accent3">
+        <a:tint val="50000"/>
+      </a:schemeClr>
+    </dgm:fillClrLst>
+    <dgm:linClrLst meth="repeat">
+      <a:schemeClr val="lt1"/>
+    </dgm:linClrLst>
+    <dgm:effectClrLst/>
+    <dgm:txLinClrLst/>
+    <dgm:txFillClrLst meth="repeat">
+      <a:schemeClr val="lt1"/>
+    </dgm:txFillClrLst>
+    <dgm:txEffectClrLst/>
+  </dgm:styleLbl>
+  <dgm:styleLbl name="alignImgPlace1">
+    <dgm:fillClrLst>
+      <a:schemeClr val="accent2">
+        <a:tint val="50000"/>
+      </a:schemeClr>
+      <a:schemeClr val="accent3">
+        <a:tint val="20000"/>
+      </a:schemeClr>
+    </dgm:fillClrLst>
+    <dgm:linClrLst meth="repeat">
+      <a:schemeClr val="lt1"/>
+    </dgm:linClrLst>
+    <dgm:effectClrLst/>
+    <dgm:txLinClrLst/>
+    <dgm:txFillClrLst meth="repeat">
+      <a:schemeClr val="lt1"/>
+    </dgm:txFillClrLst>
+    <dgm:txEffectClrLst/>
+  </dgm:styleLbl>
+  <dgm:styleLbl name="bgImgPlace1">
+    <dgm:fillClrLst>
+      <a:schemeClr val="accent2">
+        <a:tint val="50000"/>
+      </a:schemeClr>
+      <a:schemeClr val="accent3">
+        <a:tint val="20000"/>
+      </a:schemeClr>
+    </dgm:fillClrLst>
+    <dgm:linClrLst meth="repeat">
+      <a:schemeClr val="lt1"/>
+    </dgm:linClrLst>
+    <dgm:effectClrLst/>
+    <dgm:txLinClrLst/>
+    <dgm:txFillClrLst meth="repeat">
+      <a:schemeClr val="lt1"/>
+    </dgm:txFillClrLst>
+    <dgm:txEffectClrLst/>
+  </dgm:styleLbl>
+  <dgm:styleLbl name="sibTrans2D1">
+    <dgm:fillClrLst>
+      <a:schemeClr val="accent2"/>
+      <a:schemeClr val="accent3"/>
+    </dgm:fillClrLst>
+    <dgm:linClrLst meth="repeat">
+      <a:schemeClr val="lt1"/>
+    </dgm:linClrLst>
+    <dgm:effectClrLst/>
+    <dgm:txLinClrLst/>
+    <dgm:txFillClrLst/>
+    <dgm:txEffectClrLst/>
+  </dgm:styleLbl>
+  <dgm:styleLbl name="fgSibTrans2D1">
+    <dgm:fillClrLst>
+      <a:schemeClr val="accent2"/>
+      <a:schemeClr val="accent3"/>
+    </dgm:fillClrLst>
+    <dgm:linClrLst meth="repeat">
+      <a:schemeClr val="lt1"/>
+    </dgm:linClrLst>
+    <dgm:effectClrLst/>
+    <dgm:txLinClrLst/>
+    <dgm:txFillClrLst meth="repeat">
+      <a:schemeClr val="lt1"/>
+    </dgm:txFillClrLst>
+    <dgm:txEffectClrLst/>
+  </dgm:styleLbl>
+  <dgm:styleLbl name="bgSibTrans2D1">
+    <dgm:fillClrLst>
+      <a:schemeClr val="accent2"/>
+      <a:schemeClr val="accent3"/>
+    </dgm:fillClrLst>
+    <dgm:linClrLst meth="repeat">
+      <a:schemeClr val="lt1"/>
+    </dgm:linClrLst>
+    <dgm:effectClrLst/>
+    <dgm:txLinClrLst/>
+    <dgm:txFillClrLst meth="repeat">
+      <a:schemeClr val="lt1"/>
+    </dgm:txFillClrLst>
+    <dgm:txEffectClrLst/>
+  </dgm:styleLbl>
+  <dgm:styleLbl name="sibTrans1D1">
+    <dgm:fillClrLst/>
+    <dgm:linClrLst>
+      <a:schemeClr val="accent2"/>
+      <a:schemeClr val="accent3"/>
+    </dgm:linClrLst>
+    <dgm:effectClrLst/>
+    <dgm:txLinClrLst/>
+    <dgm:txFillClrLst meth="repeat">
+      <a:schemeClr val="tx1"/>
+    </dgm:txFillClrLst>
+    <dgm:txEffectClrLst/>
+  </dgm:styleLbl>
+  <dgm:styleLbl name="callout">
+    <dgm:fillClrLst meth="repeat">
+      <a:schemeClr val="accent2"/>
+    </dgm:fillClrLst>
+    <dgm:linClrLst meth="repeat">
+      <a:schemeClr val="accent2">
+        <a:tint val="50000"/>
+      </a:schemeClr>
+    </dgm:linClrLst>
+    <dgm:effectClrLst/>
+    <dgm:txLinClrLst/>
+    <dgm:txFillClrLst meth="repeat">
+      <a:schemeClr val="tx1"/>
+    </dgm:txFillClrLst>
+    <dgm:txEffectClrLst/>
+  </dgm:styleLbl>
+  <dgm:styleLbl name="asst0">
+    <dgm:fillClrLst meth="repeat">
+      <a:schemeClr val="accent2"/>
+    </dgm:fillClrLst>
+    <dgm:linClrLst meth="repeat">
+      <a:schemeClr val="lt1">
+        <a:shade val="80000"/>
+      </a:schemeClr>
+    </dgm:linClrLst>
+    <dgm:effectClrLst/>
+    <dgm:txLinClrLst/>
+    <dgm:txFillClrLst/>
+    <dgm:txEffectClrLst/>
+  </dgm:styleLbl>
+  <dgm:styleLbl name="asst1">
+    <dgm:fillClrLst meth="repeat">
+      <a:schemeClr val="accent3"/>
+    </dgm:fillClrLst>
+    <dgm:linClrLst meth="repeat">
+      <a:schemeClr val="lt1">
+        <a:shade val="80000"/>
+      </a:schemeClr>
+    </dgm:linClrLst>
+    <dgm:effectClrLst/>
+    <dgm:txLinClrLst/>
+    <dgm:txFillClrLst/>
+    <dgm:txEffectClrLst/>
+  </dgm:styleLbl>
+  <dgm:styleLbl name="asst2">
+    <dgm:fillClrLst>
+      <a:schemeClr val="accent4"/>
+    </dgm:fillClrLst>
+    <dgm:linClrLst meth="repeat">
+      <a:schemeClr val="lt1"/>
+    </dgm:linClrLst>
+    <dgm:effectClrLst/>
+    <dgm:txLinClrLst/>
+    <dgm:txFillClrLst/>
+    <dgm:txEffectClrLst/>
+  </dgm:styleLbl>
+  <dgm:styleLbl name="asst3">
+    <dgm:fillClrLst>
+      <a:schemeClr val="accent5"/>
+    </dgm:fillClrLst>
+    <dgm:linClrLst meth="repeat">
+      <a:schemeClr val="lt1"/>
+    </dgm:linClrLst>
+    <dgm:effectClrLst/>
+    <dgm:txLinClrLst/>
+    <dgm:txFillClrLst/>
+    <dgm:txEffectClrLst/>
+  </dgm:styleLbl>
+  <dgm:styleLbl name="asst4">
+    <dgm:fillClrLst>
+      <a:schemeClr val="accent6"/>
+    </dgm:fillClrLst>
+    <dgm:linClrLst meth="repeat">
+      <a:schemeClr val="lt1"/>
+    </dgm:linClrLst>
+    <dgm:effectClrLst/>
+    <dgm:txLinClrLst/>
+    <dgm:txFillClrLst/>
+    <dgm:txEffectClrLst/>
+  </dgm:styleLbl>
+  <dgm:styleLbl name="parChTrans2D1">
+    <dgm:fillClrLst meth="repeat">
+      <a:schemeClr val="accent2"/>
+    </dgm:fillClrLst>
+    <dgm:linClrLst meth="repeat">
+      <a:schemeClr val="lt1"/>
+    </dgm:linClrLst>
+    <dgm:effectClrLst/>
+    <dgm:txLinClrLst/>
+    <dgm:txFillClrLst meth="repeat">
+      <a:schemeClr val="lt1"/>
+    </dgm:txFillClrLst>
+    <dgm:txEffectClrLst/>
+  </dgm:styleLbl>
+  <dgm:styleLbl name="parChTrans2D2">
+    <dgm:fillClrLst meth="repeat">
+      <a:schemeClr val="accent3"/>
+    </dgm:fillClrLst>
+    <dgm:linClrLst meth="repeat">
+      <a:schemeClr val="lt1"/>
+    </dgm:linClrLst>
+    <dgm:effectClrLst/>
+    <dgm:txLinClrLst/>
+    <dgm:txFillClrLst/>
+    <dgm:txEffectClrLst/>
+  </dgm:styleLbl>
+  <dgm:styleLbl name="parChTrans2D3">
+    <dgm:fillClrLst meth="repeat">
+      <a:schemeClr val="accent4"/>
+    </dgm:fillClrLst>
+    <dgm:linClrLst meth="repeat">
+      <a:schemeClr val="lt1"/>
+    </dgm:linClrLst>
+    <dgm:effectClrLst/>
+    <dgm:txLinClrLst/>
+    <dgm:txFillClrLst/>
+    <dgm:txEffectClrLst/>
+  </dgm:styleLbl>
+  <dgm:styleLbl name="parChTrans2D4">
+    <dgm:fillClrLst meth="repeat">
+      <a:schemeClr val="accent5"/>
+    </dgm:fillClrLst>
+    <dgm:linClrLst meth="repeat">
+      <a:schemeClr val="lt1"/>
+    </dgm:linClrLst>
+    <dgm:effectClrLst/>
+    <dgm:txLinClrLst/>
+    <dgm:txFillClrLst meth="repeat">
+      <a:schemeClr val="lt1"/>
+    </dgm:txFillClrLst>
+    <dgm:txEffectClrLst/>
+  </dgm:styleLbl>
+  <dgm:styleLbl name="parChTrans1D1">
+    <dgm:fillClrLst meth="repeat">
+      <a:schemeClr val="accent2"/>
+    </dgm:fillClrLst>
+    <dgm:linClrLst meth="repeat">
+      <a:schemeClr val="accent2"/>
+    </dgm:linClrLst>
+    <dgm:effectClrLst/>
+    <dgm:txLinClrLst/>
+    <dgm:txFillClrLst meth="repeat">
+      <a:schemeClr val="tx1"/>
+    </dgm:txFillClrLst>
+    <dgm:txEffectClrLst/>
+  </dgm:styleLbl>
+  <dgm:styleLbl name="parChTrans1D2">
+    <dgm:fillClrLst meth="repeat">
+      <a:schemeClr val="accent2">
+        <a:tint val="90000"/>
+      </a:schemeClr>
+    </dgm:fillClrLst>
+    <dgm:linClrLst meth="repeat">
+      <a:schemeClr val="accent3"/>
+    </dgm:linClrLst>
+    <dgm:effectClrLst/>
+    <dgm:txLinClrLst/>
+    <dgm:txFillClrLst meth="repeat">
+      <a:schemeClr val="tx1"/>
+    </dgm:txFillClrLst>
+    <dgm:txEffectClrLst/>
+  </dgm:styleLbl>
+  <dgm:styleLbl name="parChTrans1D3">
+    <dgm:fillClrLst meth="repeat">
+      <a:schemeClr val="accent2">
+        <a:tint val="70000"/>
+      </a:schemeClr>
+    </dgm:fillClrLst>
+    <dgm:linClrLst meth="repeat">
+      <a:schemeClr val="accent4"/>
+    </dgm:linClrLst>
+    <dgm:effectClrLst/>
+    <dgm:txLinClrLst/>
+    <dgm:txFillClrLst meth="repeat">
+      <a:schemeClr val="tx1"/>
+    </dgm:txFillClrLst>
+    <dgm:txEffectClrLst/>
+  </dgm:styleLbl>
+  <dgm:styleLbl name="parChTrans1D4">
+    <dgm:fillClrLst meth="repeat">
+      <a:schemeClr val="accent2">
+        <a:tint val="50000"/>
+      </a:schemeClr>
+    </dgm:fillClrLst>
+    <dgm:linClrLst meth="repeat">
+      <a:schemeClr val="accent5"/>
+    </dgm:linClrLst>
+    <dgm:effectClrLst/>
+    <dgm:txLinClrLst/>
+    <dgm:txFillClrLst meth="repeat">
+      <a:schemeClr val="tx1"/>
+    </dgm:txFillClrLst>
+    <dgm:txEffectClrLst/>
+  </dgm:styleLbl>
+  <dgm:styleLbl name="fgAcc1">
+    <dgm:fillClrLst meth="repeat">
+      <a:schemeClr val="lt1">
+        <a:alpha val="90000"/>
+      </a:schemeClr>
+    </dgm:fillClrLst>
+    <dgm:linClrLst>
+      <a:schemeClr val="accent2"/>
+      <a:schemeClr val="accent3"/>
+    </dgm:linClrLst>
+    <dgm:effectClrLst/>
+    <dgm:txLinClrLst/>
+    <dgm:txFillClrLst meth="repeat">
+      <a:schemeClr val="dk1"/>
+    </dgm:txFillClrLst>
+    <dgm:txEffectClrLst/>
+  </dgm:styleLbl>
+  <dgm:styleLbl name="conFgAcc1">
+    <dgm:fillClrLst meth="repeat">
+      <a:schemeClr val="lt1">
+        <a:alpha val="90000"/>
+      </a:schemeClr>
+    </dgm:fillClrLst>
+    <dgm:linClrLst>
+      <a:schemeClr val="accent2"/>
+      <a:schemeClr val="accent3"/>
+    </dgm:linClrLst>
+    <dgm:effectClrLst/>
+    <dgm:txLinClrLst/>
+    <dgm:txFillClrLst meth="repeat">
+      <a:schemeClr val="dk1"/>
+    </dgm:txFillClrLst>
+    <dgm:txEffectClrLst/>
+  </dgm:styleLbl>
+  <dgm:styleLbl name="alignAcc1">
+    <dgm:fillClrLst meth="repeat">
+      <a:schemeClr val="lt1">
+        <a:alpha val="90000"/>
+      </a:schemeClr>
+    </dgm:fillClrLst>
+    <dgm:linClrLst>
+      <a:schemeClr val="accent2"/>
+      <a:schemeClr val="accent3"/>
+    </dgm:linClrLst>
+    <dgm:effectClrLst/>
+    <dgm:txLinClrLst/>
+    <dgm:txFillClrLst meth="repeat">
+      <a:schemeClr val="dk1"/>
+    </dgm:txFillClrLst>
+    <dgm:txEffectClrLst/>
+  </dgm:styleLbl>
+  <dgm:styleLbl name="trAlignAcc1">
+    <dgm:fillClrLst meth="repeat">
+      <a:schemeClr val="lt1">
+        <a:alpha val="40000"/>
+      </a:schemeClr>
+    </dgm:fillClrLst>
+    <dgm:linClrLst meth="repeat">
+      <a:schemeClr val="accent2"/>
+    </dgm:linClrLst>
+    <dgm:effectClrLst/>
+    <dgm:txLinClrLst/>
+    <dgm:txFillClrLst meth="repeat">
+      <a:schemeClr val="dk1"/>
+    </dgm:txFillClrLst>
+    <dgm:txEffectClrLst/>
+  </dgm:styleLbl>
+  <dgm:styleLbl name="bgAcc1">
+    <dgm:fillClrLst meth="repeat">
+      <a:schemeClr val="lt1">
+        <a:alpha val="90000"/>
+      </a:schemeClr>
+    </dgm:fillClrLst>
+    <dgm:linClrLst>
+      <a:schemeClr val="accent2"/>
+      <a:schemeClr val="accent3"/>
+    </dgm:linClrLst>
+    <dgm:effectClrLst/>
+    <dgm:txLinClrLst/>
+    <dgm:txFillClrLst meth="repeat">
+      <a:schemeClr val="dk1"/>
+    </dgm:txFillClrLst>
+    <dgm:txEffectClrLst/>
+  </dgm:styleLbl>
+  <dgm:styleLbl name="solidFgAcc1">
+    <dgm:fillClrLst meth="repeat">
+      <a:schemeClr val="lt1"/>
+    </dgm:fillClrLst>
+    <dgm:linClrLst>
+      <a:schemeClr val="accent2"/>
+      <a:schemeClr val="accent3"/>
+    </dgm:linClrLst>
+    <dgm:effectClrLst/>
+    <dgm:txLinClrLst/>
+    <dgm:txFillClrLst meth="repeat">
+      <a:schemeClr val="dk1"/>
+    </dgm:txFillClrLst>
+    <dgm:txEffectClrLst/>
+  </dgm:styleLbl>
+  <dgm:styleLbl name="solidAlignAcc1">
+    <dgm:fillClrLst meth="repeat">
+      <a:schemeClr val="lt1"/>
+    </dgm:fillClrLst>
+    <dgm:linClrLst>
+      <a:schemeClr val="accent2"/>
+      <a:schemeClr val="accent3"/>
+    </dgm:linClrLst>
+    <dgm:effectClrLst/>
+    <dgm:txLinClrLst/>
+    <dgm:txFillClrLst meth="repeat">
+      <a:schemeClr val="dk1"/>
+    </dgm:txFillClrLst>
+    <dgm:txEffectClrLst/>
+  </dgm:styleLbl>
+  <dgm:styleLbl name="solidBgAcc1">
+    <dgm:fillClrLst meth="repeat">
+      <a:schemeClr val="lt1"/>
+    </dgm:fillClrLst>
+    <dgm:linClrLst>
+      <a:schemeClr val="accent2"/>
+      <a:schemeClr val="accent3"/>
+    </dgm:linClrLst>
+    <dgm:effectClrLst/>
+    <dgm:txLinClrLst/>
+    <dgm:txFillClrLst meth="repeat">
+      <a:schemeClr val="dk1"/>
+    </dgm:txFillClrLst>
+    <dgm:txEffectClrLst/>
+  </dgm:styleLbl>
+  <dgm:styleLbl name="fgAccFollowNode1">
+    <dgm:fillClrLst>
+      <a:schemeClr val="accent2">
+        <a:tint val="40000"/>
+        <a:alpha val="90000"/>
+      </a:schemeClr>
+      <a:schemeClr val="accent3">
+        <a:tint val="40000"/>
+        <a:alpha val="90000"/>
+      </a:schemeClr>
+    </dgm:fillClrLst>
+    <dgm:linClrLst>
+      <a:schemeClr val="accent2">
+        <a:tint val="40000"/>
+        <a:alpha val="90000"/>
+      </a:schemeClr>
+      <a:schemeClr val="accent3">
+        <a:tint val="40000"/>
+        <a:alpha val="90000"/>
+      </a:schemeClr>
+    </dgm:linClrLst>
+    <dgm:effectClrLst/>
+    <dgm:txLinClrLst/>
+    <dgm:txFillClrLst meth="repeat">
+      <a:schemeClr val="dk1"/>
+    </dgm:txFillClrLst>
+    <dgm:txEffectClrLst/>
+  </dgm:styleLbl>
+  <dgm:styleLbl name="alignAccFollowNode1">
+    <dgm:fillClrLst>
+      <a:schemeClr val="accent2">
+        <a:tint val="40000"/>
+        <a:alpha val="90000"/>
+      </a:schemeClr>
+      <a:schemeClr val="accent3">
+        <a:tint val="40000"/>
+        <a:alpha val="90000"/>
+      </a:schemeClr>
+    </dgm:fillClrLst>
+    <dgm:linClrLst>
+      <a:schemeClr val="accent2">
+        <a:tint val="40000"/>
+        <a:alpha val="90000"/>
+      </a:schemeClr>
+      <a:schemeClr val="accent3">
+        <a:tint val="40000"/>
+        <a:alpha val="90000"/>
+      </a:schemeClr>
+    </dgm:linClrLst>
+    <dgm:effectClrLst/>
+    <dgm:txLinClrLst/>
+    <dgm:txFillClrLst meth="repeat">
+      <a:schemeClr val="dk1"/>
+    </dgm:txFillClrLst>
+    <dgm:txEffectClrLst/>
+  </dgm:styleLbl>
+  <dgm:styleLbl name="bgAccFollowNode1">
+    <dgm:fillClrLst>
+      <a:schemeClr val="accent2">
+        <a:tint val="40000"/>
+        <a:alpha val="90000"/>
+      </a:schemeClr>
+      <a:schemeClr val="accent3">
+        <a:tint val="40000"/>
+        <a:alpha val="90000"/>
+      </a:schemeClr>
+    </dgm:fillClrLst>
+    <dgm:linClrLst>
+      <a:schemeClr val="accent2">
+        <a:tint val="40000"/>
+        <a:alpha val="90000"/>
+      </a:schemeClr>
+      <a:schemeClr val="accent3">
+        <a:tint val="40000"/>
+        <a:alpha val="90000"/>
+      </a:schemeClr>
+    </dgm:linClrLst>
+    <dgm:effectClrLst/>
+    <dgm:txLinClrLst/>
+    <dgm:txFillClrLst meth="repeat">
+      <a:schemeClr val="dk1"/>
+    </dgm:txFillClrLst>
+    <dgm:txEffectClrLst/>
+  </dgm:styleLbl>
+  <dgm:styleLbl name="fgAcc0">
+    <dgm:fillClrLst meth="repeat">
+      <a:schemeClr val="lt1">
+        <a:alpha val="90000"/>
+      </a:schemeClr>
+    </dgm:fillClrLst>
+    <dgm:linClrLst>
+      <a:schemeClr val="accent1"/>
+    </dgm:linClrLst>
+    <dgm:effectClrLst/>
+    <dgm:txLinClrLst/>
+    <dgm:txFillClrLst meth="repeat">
+      <a:schemeClr val="dk1"/>
+    </dgm:txFillClrLst>
+    <dgm:txEffectClrLst/>
+  </dgm:styleLbl>
+  <dgm:styleLbl name="fgAcc2">
+    <dgm:fillClrLst meth="repeat">
+      <a:schemeClr val="lt1">
+        <a:alpha val="90000"/>
+      </a:schemeClr>
+    </dgm:fillClrLst>
+    <dgm:linClrLst>
+      <a:schemeClr val="accent3"/>
+    </dgm:linClrLst>
+    <dgm:effectClrLst/>
+    <dgm:txLinClrLst/>
+    <dgm:txFillClrLst meth="repeat">
+      <a:schemeClr val="dk1"/>
+    </dgm:txFillClrLst>
+    <dgm:txEffectClrLst/>
+  </dgm:styleLbl>
+  <dgm:styleLbl name="fgAcc3">
+    <dgm:fillClrLst meth="repeat">
+      <a:schemeClr val="lt1">
+        <a:alpha val="90000"/>
+      </a:schemeClr>
+    </dgm:fillClrLst>
+    <dgm:linClrLst>
+      <a:schemeClr val="accent4"/>
+    </dgm:linClrLst>
+    <dgm:effectClrLst/>
+    <dgm:txLinClrLst/>
+    <dgm:txFillClrLst meth="repeat">
+      <a:schemeClr val="dk1"/>
+    </dgm:txFillClrLst>
+    <dgm:txEffectClrLst/>
+  </dgm:styleLbl>
+  <dgm:styleLbl name="fgAcc4">
+    <dgm:fillClrLst meth="repeat">
+      <a:schemeClr val="lt1">
+        <a:alpha val="90000"/>
+      </a:schemeClr>
+    </dgm:fillClrLst>
+    <dgm:linClrLst>
+      <a:schemeClr val="accent5"/>
+    </dgm:linClrLst>
+    <dgm:effectClrLst/>
+    <dgm:txLinClrLst/>
+    <dgm:txFillClrLst meth="repeat">
+      <a:schemeClr val="dk1"/>
+    </dgm:txFillClrLst>
+    <dgm:txEffectClrLst/>
+  </dgm:styleLbl>
+  <dgm:styleLbl name="bgShp">
+    <dgm:fillClrLst meth="repeat">
+      <a:schemeClr val="accent2">
+        <a:tint val="40000"/>
+      </a:schemeClr>
+    </dgm:fillClrLst>
+    <dgm:linClrLst meth="repeat">
+      <a:schemeClr val="dk1"/>
+    </dgm:linClrLst>
+    <dgm:effectClrLst/>
+    <dgm:txLinClrLst/>
+    <dgm:txFillClrLst meth="repeat">
+      <a:schemeClr val="dk1"/>
+    </dgm:txFillClrLst>
+    <dgm:txEffectClrLst/>
+  </dgm:styleLbl>
+  <dgm:styleLbl name="dkBgShp">
+    <dgm:fillClrLst meth="repeat">
+      <a:schemeClr val="accent2">
+        <a:shade val="90000"/>
+      </a:schemeClr>
+    </dgm:fillClrLst>
+    <dgm:linClrLst meth="repeat">
+      <a:schemeClr val="dk1"/>
+    </dgm:linClrLst>
+    <dgm:effectClrLst/>
+    <dgm:txLinClrLst/>
+    <dgm:txFillClrLst meth="repeat">
+      <a:schemeClr val="lt1"/>
+    </dgm:txFillClrLst>
+    <dgm:txEffectClrLst/>
+  </dgm:styleLbl>
+  <dgm:styleLbl name="trBgShp">
+    <dgm:fillClrLst meth="repeat">
+      <a:schemeClr val="accent2">
+        <a:tint val="50000"/>
+        <a:alpha val="40000"/>
+      </a:schemeClr>
+    </dgm:fillClrLst>
+    <dgm:linClrLst meth="repeat">
+      <a:schemeClr val="accent2"/>
+    </dgm:linClrLst>
+    <dgm:effectClrLst/>
+    <dgm:txLinClrLst/>
+    <dgm:txFillClrLst meth="repeat">
+      <a:schemeClr val="lt1"/>
+    </dgm:txFillClrLst>
+    <dgm:txEffectClrLst/>
+  </dgm:styleLbl>
+  <dgm:styleLbl name="fgShp">
+    <dgm:fillClrLst meth="repeat">
+      <a:schemeClr val="accent2">
+        <a:tint val="40000"/>
+      </a:schemeClr>
+    </dgm:fillClrLst>
+    <dgm:linClrLst meth="repeat">
+      <a:schemeClr val="lt1"/>
+    </dgm:linClrLst>
+    <dgm:effectClrLst/>
+    <dgm:txLinClrLst/>
+    <dgm:txFillClrLst meth="repeat">
+      <a:schemeClr val="dk1"/>
+    </dgm:txFillClrLst>
+    <dgm:txEffectClrLst/>
+  </dgm:styleLbl>
+  <dgm:styleLbl name="revTx">
+    <dgm:fillClrLst meth="repeat">
+      <a:schemeClr val="lt1">
+        <a:alpha val="0"/>
+      </a:schemeClr>
+    </dgm:fillClrLst>
+    <dgm:linClrLst meth="repeat">
+      <a:schemeClr val="dk1">
+        <a:alpha val="0"/>
+      </a:schemeClr>
+    </dgm:linClrLst>
+    <dgm:effectClrLst/>
+    <dgm:txLinClrLst/>
+    <dgm:txFillClrLst meth="repeat">
+      <a:schemeClr val="tx1"/>
+    </dgm:txFillClrLst>
+    <dgm:txEffectClrLst/>
+  </dgm:styleLbl>
+</dgm:colorsDef>
+</file>
+
+<file path=ppt/diagrams/data1.xml><?xml version="1.0" encoding="utf-8"?>
+<dgm:dataModel xmlns:dgm="http://schemas.openxmlformats.org/drawingml/2006/diagram" xmlns:a="http://schemas.openxmlformats.org/drawingml/2006/main">
+  <dgm:ptLst>
+    <dgm:pt modelId="{E11C9175-C29A-43B8-A6F8-9AF8B929FB8C}" type="doc">
+      <dgm:prSet loTypeId="urn:microsoft.com/office/officeart/2005/8/layout/vList2" loCatId="list" qsTypeId="urn:microsoft.com/office/officeart/2005/8/quickstyle/simple1" qsCatId="simple" csTypeId="urn:microsoft.com/office/officeart/2005/8/colors/colorful2" csCatId="colorful"/>
+      <dgm:spPr/>
+      <dgm:t>
+        <a:bodyPr/>
+        <a:lstStyle/>
+        <a:p>
+          <a:endParaRPr lang="en-US"/>
+        </a:p>
+      </dgm:t>
+    </dgm:pt>
+    <dgm:pt modelId="{DBFA6142-40EC-4B34-8742-E3401514D79D}">
+      <dgm:prSet/>
+      <dgm:spPr/>
+      <dgm:t>
+        <a:bodyPr/>
+        <a:lstStyle/>
+        <a:p>
+          <a:r>
+            <a:rPr lang="en-CA"/>
+            <a:t>Role Base Authentication</a:t>
+          </a:r>
+          <a:endParaRPr lang="en-US"/>
+        </a:p>
+      </dgm:t>
+    </dgm:pt>
+    <dgm:pt modelId="{62AD846B-3A0B-4025-AE5F-ECCA88040654}" type="parTrans" cxnId="{ED6F10F5-BE9A-45FB-B931-5738B34E573B}">
+      <dgm:prSet/>
+      <dgm:spPr/>
+      <dgm:t>
+        <a:bodyPr/>
+        <a:lstStyle/>
+        <a:p>
+          <a:endParaRPr lang="en-US"/>
+        </a:p>
+      </dgm:t>
+    </dgm:pt>
+    <dgm:pt modelId="{6F0526AF-86FF-403D-9BEE-B7D9267AAB95}" type="sibTrans" cxnId="{ED6F10F5-BE9A-45FB-B931-5738B34E573B}">
+      <dgm:prSet/>
+      <dgm:spPr/>
+      <dgm:t>
+        <a:bodyPr/>
+        <a:lstStyle/>
+        <a:p>
+          <a:endParaRPr lang="en-US"/>
+        </a:p>
+      </dgm:t>
+    </dgm:pt>
+    <dgm:pt modelId="{B23C1FE5-088A-47E7-94F4-292D9D5D2553}">
+      <dgm:prSet/>
+      <dgm:spPr/>
+      <dgm:t>
+        <a:bodyPr/>
+        <a:lstStyle/>
+        <a:p>
+          <a:r>
+            <a:rPr lang="en-CA"/>
+            <a:t>Permission Base Authentication</a:t>
+          </a:r>
+          <a:endParaRPr lang="en-US"/>
+        </a:p>
+      </dgm:t>
+    </dgm:pt>
+    <dgm:pt modelId="{1FD11518-BE11-4A7E-AC0C-6865A6DDB53E}" type="parTrans" cxnId="{7754C3C3-EC46-4BAF-994B-346D1DC1C73E}">
+      <dgm:prSet/>
+      <dgm:spPr/>
+      <dgm:t>
+        <a:bodyPr/>
+        <a:lstStyle/>
+        <a:p>
+          <a:endParaRPr lang="en-US"/>
+        </a:p>
+      </dgm:t>
+    </dgm:pt>
+    <dgm:pt modelId="{2BAE01EA-3705-489B-93C3-8B725726E236}" type="sibTrans" cxnId="{7754C3C3-EC46-4BAF-994B-346D1DC1C73E}">
+      <dgm:prSet/>
+      <dgm:spPr/>
+      <dgm:t>
+        <a:bodyPr/>
+        <a:lstStyle/>
+        <a:p>
+          <a:endParaRPr lang="en-US"/>
+        </a:p>
+      </dgm:t>
+    </dgm:pt>
+    <dgm:pt modelId="{5C8109C6-68A4-4AFE-949E-9D4F852F3CC4}">
+      <dgm:prSet/>
+      <dgm:spPr/>
+      <dgm:t>
+        <a:bodyPr/>
+        <a:lstStyle/>
+        <a:p>
+          <a:r>
+            <a:rPr lang="en-CA"/>
+            <a:t>Method Base Authentication with Annotation</a:t>
+          </a:r>
+          <a:endParaRPr lang="en-US"/>
+        </a:p>
+      </dgm:t>
+    </dgm:pt>
+    <dgm:pt modelId="{D94C2DFB-8053-4539-A24C-E8500CF4D711}" type="parTrans" cxnId="{BA7FA415-B580-490D-A7B5-C0B60D02C70D}">
+      <dgm:prSet/>
+      <dgm:spPr/>
+      <dgm:t>
+        <a:bodyPr/>
+        <a:lstStyle/>
+        <a:p>
+          <a:endParaRPr lang="en-US"/>
+        </a:p>
+      </dgm:t>
+    </dgm:pt>
+    <dgm:pt modelId="{2B5D2916-DDCF-4360-A7D8-75431BD61F8B}" type="sibTrans" cxnId="{BA7FA415-B580-490D-A7B5-C0B60D02C70D}">
+      <dgm:prSet/>
+      <dgm:spPr/>
+      <dgm:t>
+        <a:bodyPr/>
+        <a:lstStyle/>
+        <a:p>
+          <a:endParaRPr lang="en-US"/>
+        </a:p>
+      </dgm:t>
+    </dgm:pt>
+    <dgm:pt modelId="{3094E173-9910-47BC-B795-54999D4331E4}" type="pres">
+      <dgm:prSet presAssocID="{E11C9175-C29A-43B8-A6F8-9AF8B929FB8C}" presName="linear" presStyleCnt="0">
+        <dgm:presLayoutVars>
+          <dgm:animLvl val="lvl"/>
+          <dgm:resizeHandles val="exact"/>
+        </dgm:presLayoutVars>
+      </dgm:prSet>
+      <dgm:spPr/>
+    </dgm:pt>
+    <dgm:pt modelId="{2DD81D80-B222-4EA5-9034-7A3CAC3BBB88}" type="pres">
+      <dgm:prSet presAssocID="{DBFA6142-40EC-4B34-8742-E3401514D79D}" presName="parentText" presStyleLbl="node1" presStyleIdx="0" presStyleCnt="3">
+        <dgm:presLayoutVars>
+          <dgm:chMax val="0"/>
+          <dgm:bulletEnabled val="1"/>
+        </dgm:presLayoutVars>
+      </dgm:prSet>
+      <dgm:spPr/>
+    </dgm:pt>
+    <dgm:pt modelId="{28772364-272E-4A4C-A412-893B665E1B60}" type="pres">
+      <dgm:prSet presAssocID="{6F0526AF-86FF-403D-9BEE-B7D9267AAB95}" presName="spacer" presStyleCnt="0"/>
+      <dgm:spPr/>
+    </dgm:pt>
+    <dgm:pt modelId="{A4CAEE17-26D5-4A93-9BD6-4DD80E87AF67}" type="pres">
+      <dgm:prSet presAssocID="{B23C1FE5-088A-47E7-94F4-292D9D5D2553}" presName="parentText" presStyleLbl="node1" presStyleIdx="1" presStyleCnt="3">
+        <dgm:presLayoutVars>
+          <dgm:chMax val="0"/>
+          <dgm:bulletEnabled val="1"/>
+        </dgm:presLayoutVars>
+      </dgm:prSet>
+      <dgm:spPr/>
+    </dgm:pt>
+    <dgm:pt modelId="{B5AFFCCC-4740-4E9F-AABD-66102C070552}" type="pres">
+      <dgm:prSet presAssocID="{2BAE01EA-3705-489B-93C3-8B725726E236}" presName="spacer" presStyleCnt="0"/>
+      <dgm:spPr/>
+    </dgm:pt>
+    <dgm:pt modelId="{032267C9-6626-404E-8B65-A3DD150A8741}" type="pres">
+      <dgm:prSet presAssocID="{5C8109C6-68A4-4AFE-949E-9D4F852F3CC4}" presName="parentText" presStyleLbl="node1" presStyleIdx="2" presStyleCnt="3">
+        <dgm:presLayoutVars>
+          <dgm:chMax val="0"/>
+          <dgm:bulletEnabled val="1"/>
+        </dgm:presLayoutVars>
+      </dgm:prSet>
+      <dgm:spPr/>
+    </dgm:pt>
+  </dgm:ptLst>
+  <dgm:cxnLst>
+    <dgm:cxn modelId="{BA7FA415-B580-490D-A7B5-C0B60D02C70D}" srcId="{E11C9175-C29A-43B8-A6F8-9AF8B929FB8C}" destId="{5C8109C6-68A4-4AFE-949E-9D4F852F3CC4}" srcOrd="2" destOrd="0" parTransId="{D94C2DFB-8053-4539-A24C-E8500CF4D711}" sibTransId="{2B5D2916-DDCF-4360-A7D8-75431BD61F8B}"/>
+    <dgm:cxn modelId="{7E79D45D-5CC8-407F-A9DC-E541100D95AD}" type="presOf" srcId="{B23C1FE5-088A-47E7-94F4-292D9D5D2553}" destId="{A4CAEE17-26D5-4A93-9BD6-4DD80E87AF67}" srcOrd="0" destOrd="0" presId="urn:microsoft.com/office/officeart/2005/8/layout/vList2"/>
+    <dgm:cxn modelId="{E8DBEE74-707D-4AD8-A94F-9DC559984CB3}" type="presOf" srcId="{DBFA6142-40EC-4B34-8742-E3401514D79D}" destId="{2DD81D80-B222-4EA5-9034-7A3CAC3BBB88}" srcOrd="0" destOrd="0" presId="urn:microsoft.com/office/officeart/2005/8/layout/vList2"/>
+    <dgm:cxn modelId="{7754C3C3-EC46-4BAF-994B-346D1DC1C73E}" srcId="{E11C9175-C29A-43B8-A6F8-9AF8B929FB8C}" destId="{B23C1FE5-088A-47E7-94F4-292D9D5D2553}" srcOrd="1" destOrd="0" parTransId="{1FD11518-BE11-4A7E-AC0C-6865A6DDB53E}" sibTransId="{2BAE01EA-3705-489B-93C3-8B725726E236}"/>
+    <dgm:cxn modelId="{72B238E9-3A14-41A1-B929-870EDC408DF1}" type="presOf" srcId="{E11C9175-C29A-43B8-A6F8-9AF8B929FB8C}" destId="{3094E173-9910-47BC-B795-54999D4331E4}" srcOrd="0" destOrd="0" presId="urn:microsoft.com/office/officeart/2005/8/layout/vList2"/>
+    <dgm:cxn modelId="{209F62F3-8DB3-45F5-9968-177F59110F30}" type="presOf" srcId="{5C8109C6-68A4-4AFE-949E-9D4F852F3CC4}" destId="{032267C9-6626-404E-8B65-A3DD150A8741}" srcOrd="0" destOrd="0" presId="urn:microsoft.com/office/officeart/2005/8/layout/vList2"/>
+    <dgm:cxn modelId="{ED6F10F5-BE9A-45FB-B931-5738B34E573B}" srcId="{E11C9175-C29A-43B8-A6F8-9AF8B929FB8C}" destId="{DBFA6142-40EC-4B34-8742-E3401514D79D}" srcOrd="0" destOrd="0" parTransId="{62AD846B-3A0B-4025-AE5F-ECCA88040654}" sibTransId="{6F0526AF-86FF-403D-9BEE-B7D9267AAB95}"/>
+    <dgm:cxn modelId="{3037C917-76FF-407B-B174-1219DFA115C0}" type="presParOf" srcId="{3094E173-9910-47BC-B795-54999D4331E4}" destId="{2DD81D80-B222-4EA5-9034-7A3CAC3BBB88}" srcOrd="0" destOrd="0" presId="urn:microsoft.com/office/officeart/2005/8/layout/vList2"/>
+    <dgm:cxn modelId="{3A1313CC-3C96-437E-8748-756A5032C1F9}" type="presParOf" srcId="{3094E173-9910-47BC-B795-54999D4331E4}" destId="{28772364-272E-4A4C-A412-893B665E1B60}" srcOrd="1" destOrd="0" presId="urn:microsoft.com/office/officeart/2005/8/layout/vList2"/>
+    <dgm:cxn modelId="{02716A3C-7D96-44AC-9F5A-BF9FAF753F4F}" type="presParOf" srcId="{3094E173-9910-47BC-B795-54999D4331E4}" destId="{A4CAEE17-26D5-4A93-9BD6-4DD80E87AF67}" srcOrd="2" destOrd="0" presId="urn:microsoft.com/office/officeart/2005/8/layout/vList2"/>
+    <dgm:cxn modelId="{413B8E2C-430F-4924-8425-E4835E809031}" type="presParOf" srcId="{3094E173-9910-47BC-B795-54999D4331E4}" destId="{B5AFFCCC-4740-4E9F-AABD-66102C070552}" srcOrd="3" destOrd="0" presId="urn:microsoft.com/office/officeart/2005/8/layout/vList2"/>
+    <dgm:cxn modelId="{9D804E26-A7CE-48F9-B831-162555105C3C}" type="presParOf" srcId="{3094E173-9910-47BC-B795-54999D4331E4}" destId="{032267C9-6626-404E-8B65-A3DD150A8741}" srcOrd="4" destOrd="0" presId="urn:microsoft.com/office/officeart/2005/8/layout/vList2"/>
+  </dgm:cxnLst>
+  <dgm:bg/>
+  <dgm:whole/>
+  <dgm:extLst>
+    <a:ext uri="http://schemas.microsoft.com/office/drawing/2008/diagram">
+      <dsp:dataModelExt xmlns:dsp="http://schemas.microsoft.com/office/drawing/2008/diagram" relId="rId6" minVer="http://schemas.openxmlformats.org/drawingml/2006/diagram"/>
+    </a:ext>
+  </dgm:extLst>
+</dgm:dataModel>
+</file>
+
+<file path=ppt/diagrams/drawing1.xml><?xml version="1.0" encoding="utf-8"?>
+<dsp:drawing xmlns:dgm="http://schemas.openxmlformats.org/drawingml/2006/diagram" xmlns:dsp="http://schemas.microsoft.com/office/drawing/2008/diagram" xmlns:a="http://schemas.openxmlformats.org/drawingml/2006/main">
+  <dsp:spTree>
+    <dsp:nvGrpSpPr>
+      <dsp:cNvPr id="0" name=""/>
+      <dsp:cNvGrpSpPr/>
+    </dsp:nvGrpSpPr>
+    <dsp:grpSpPr/>
+    <dsp:sp modelId="{2DD81D80-B222-4EA5-9034-7A3CAC3BBB88}">
+      <dsp:nvSpPr>
+        <dsp:cNvPr id="0" name=""/>
+        <dsp:cNvSpPr/>
+      </dsp:nvSpPr>
+      <dsp:spPr>
+        <a:xfrm>
+          <a:off x="0" y="245069"/>
+          <a:ext cx="6245265" cy="1624855"/>
+        </a:xfrm>
+        <a:prstGeom prst="roundRect">
+          <a:avLst/>
+        </a:prstGeom>
+        <a:solidFill>
+          <a:schemeClr val="accent2">
+            <a:hueOff val="0"/>
+            <a:satOff val="0"/>
+            <a:lumOff val="0"/>
+            <a:alphaOff val="0"/>
+          </a:schemeClr>
+        </a:solidFill>
+        <a:ln w="12700" cap="flat" cmpd="sng" algn="ctr">
+          <a:solidFill>
+            <a:schemeClr val="lt1">
+              <a:hueOff val="0"/>
+              <a:satOff val="0"/>
+              <a:lumOff val="0"/>
+              <a:alphaOff val="0"/>
+            </a:schemeClr>
+          </a:solidFill>
+          <a:prstDash val="solid"/>
+          <a:miter lim="800000"/>
+        </a:ln>
+        <a:effectLst/>
+      </dsp:spPr>
+      <dsp:style>
+        <a:lnRef idx="2">
+          <a:scrgbClr r="0" g="0" b="0"/>
+        </a:lnRef>
+        <a:fillRef idx="1">
+          <a:scrgbClr r="0" g="0" b="0"/>
+        </a:fillRef>
+        <a:effectRef idx="0">
+          <a:scrgbClr r="0" g="0" b="0"/>
+        </a:effectRef>
+        <a:fontRef idx="minor">
+          <a:schemeClr val="lt1"/>
+        </a:fontRef>
+      </dsp:style>
+      <dsp:txBody>
+        <a:bodyPr spcFirstLastPara="0" vert="horz" wrap="square" lIns="148590" tIns="148590" rIns="148590" bIns="148590" numCol="1" spcCol="1270" anchor="ctr" anchorCtr="0">
+          <a:noAutofit/>
+        </a:bodyPr>
+        <a:lstStyle/>
+        <a:p>
+          <a:pPr marL="0" lvl="0" indent="0" algn="l" defTabSz="1733550">
+            <a:lnSpc>
+              <a:spcPct val="90000"/>
+            </a:lnSpc>
+            <a:spcBef>
+              <a:spcPct val="0"/>
+            </a:spcBef>
+            <a:spcAft>
+              <a:spcPct val="35000"/>
+            </a:spcAft>
+            <a:buNone/>
+          </a:pPr>
+          <a:r>
+            <a:rPr lang="en-CA" sz="3900" kern="1200"/>
+            <a:t>Role Base Authentication</a:t>
+          </a:r>
+          <a:endParaRPr lang="en-US" sz="3900" kern="1200"/>
+        </a:p>
+      </dsp:txBody>
+      <dsp:txXfrm>
+        <a:off x="79319" y="324388"/>
+        <a:ext cx="6086627" cy="1466217"/>
+      </dsp:txXfrm>
+    </dsp:sp>
+    <dsp:sp modelId="{A4CAEE17-26D5-4A93-9BD6-4DD80E87AF67}">
+      <dsp:nvSpPr>
+        <dsp:cNvPr id="0" name=""/>
+        <dsp:cNvSpPr/>
+      </dsp:nvSpPr>
+      <dsp:spPr>
+        <a:xfrm>
+          <a:off x="0" y="1982245"/>
+          <a:ext cx="6245265" cy="1624855"/>
+        </a:xfrm>
+        <a:prstGeom prst="roundRect">
+          <a:avLst/>
+        </a:prstGeom>
+        <a:solidFill>
+          <a:schemeClr val="accent2">
+            <a:hueOff val="3081649"/>
+            <a:satOff val="0"/>
+            <a:lumOff val="9314"/>
+            <a:alphaOff val="0"/>
+          </a:schemeClr>
+        </a:solidFill>
+        <a:ln w="12700" cap="flat" cmpd="sng" algn="ctr">
+          <a:solidFill>
+            <a:schemeClr val="lt1">
+              <a:hueOff val="0"/>
+              <a:satOff val="0"/>
+              <a:lumOff val="0"/>
+              <a:alphaOff val="0"/>
+            </a:schemeClr>
+          </a:solidFill>
+          <a:prstDash val="solid"/>
+          <a:miter lim="800000"/>
+        </a:ln>
+        <a:effectLst/>
+      </dsp:spPr>
+      <dsp:style>
+        <a:lnRef idx="2">
+          <a:scrgbClr r="0" g="0" b="0"/>
+        </a:lnRef>
+        <a:fillRef idx="1">
+          <a:scrgbClr r="0" g="0" b="0"/>
+        </a:fillRef>
+        <a:effectRef idx="0">
+          <a:scrgbClr r="0" g="0" b="0"/>
+        </a:effectRef>
+        <a:fontRef idx="minor">
+          <a:schemeClr val="lt1"/>
+        </a:fontRef>
+      </dsp:style>
+      <dsp:txBody>
+        <a:bodyPr spcFirstLastPara="0" vert="horz" wrap="square" lIns="148590" tIns="148590" rIns="148590" bIns="148590" numCol="1" spcCol="1270" anchor="ctr" anchorCtr="0">
+          <a:noAutofit/>
+        </a:bodyPr>
+        <a:lstStyle/>
+        <a:p>
+          <a:pPr marL="0" lvl="0" indent="0" algn="l" defTabSz="1733550">
+            <a:lnSpc>
+              <a:spcPct val="90000"/>
+            </a:lnSpc>
+            <a:spcBef>
+              <a:spcPct val="0"/>
+            </a:spcBef>
+            <a:spcAft>
+              <a:spcPct val="35000"/>
+            </a:spcAft>
+            <a:buNone/>
+          </a:pPr>
+          <a:r>
+            <a:rPr lang="en-CA" sz="3900" kern="1200"/>
+            <a:t>Permission Base Authentication</a:t>
+          </a:r>
+          <a:endParaRPr lang="en-US" sz="3900" kern="1200"/>
+        </a:p>
+      </dsp:txBody>
+      <dsp:txXfrm>
+        <a:off x="79319" y="2061564"/>
+        <a:ext cx="6086627" cy="1466217"/>
+      </dsp:txXfrm>
+    </dsp:sp>
+    <dsp:sp modelId="{032267C9-6626-404E-8B65-A3DD150A8741}">
+      <dsp:nvSpPr>
+        <dsp:cNvPr id="0" name=""/>
+        <dsp:cNvSpPr/>
+      </dsp:nvSpPr>
+      <dsp:spPr>
+        <a:xfrm>
+          <a:off x="0" y="3719421"/>
+          <a:ext cx="6245265" cy="1624855"/>
+        </a:xfrm>
+        <a:prstGeom prst="roundRect">
+          <a:avLst/>
+        </a:prstGeom>
+        <a:solidFill>
+          <a:schemeClr val="accent2">
+            <a:hueOff val="6163298"/>
+            <a:satOff val="0"/>
+            <a:lumOff val="18628"/>
+            <a:alphaOff val="0"/>
+          </a:schemeClr>
+        </a:solidFill>
+        <a:ln w="12700" cap="flat" cmpd="sng" algn="ctr">
+          <a:solidFill>
+            <a:schemeClr val="lt1">
+              <a:hueOff val="0"/>
+              <a:satOff val="0"/>
+              <a:lumOff val="0"/>
+              <a:alphaOff val="0"/>
+            </a:schemeClr>
+          </a:solidFill>
+          <a:prstDash val="solid"/>
+          <a:miter lim="800000"/>
+        </a:ln>
+        <a:effectLst/>
+      </dsp:spPr>
+      <dsp:style>
+        <a:lnRef idx="2">
+          <a:scrgbClr r="0" g="0" b="0"/>
+        </a:lnRef>
+        <a:fillRef idx="1">
+          <a:scrgbClr r="0" g="0" b="0"/>
+        </a:fillRef>
+        <a:effectRef idx="0">
+          <a:scrgbClr r="0" g="0" b="0"/>
+        </a:effectRef>
+        <a:fontRef idx="minor">
+          <a:schemeClr val="lt1"/>
+        </a:fontRef>
+      </dsp:style>
+      <dsp:txBody>
+        <a:bodyPr spcFirstLastPara="0" vert="horz" wrap="square" lIns="148590" tIns="148590" rIns="148590" bIns="148590" numCol="1" spcCol="1270" anchor="ctr" anchorCtr="0">
+          <a:noAutofit/>
+        </a:bodyPr>
+        <a:lstStyle/>
+        <a:p>
+          <a:pPr marL="0" lvl="0" indent="0" algn="l" defTabSz="1733550">
+            <a:lnSpc>
+              <a:spcPct val="90000"/>
+            </a:lnSpc>
+            <a:spcBef>
+              <a:spcPct val="0"/>
+            </a:spcBef>
+            <a:spcAft>
+              <a:spcPct val="35000"/>
+            </a:spcAft>
+            <a:buNone/>
+          </a:pPr>
+          <a:r>
+            <a:rPr lang="en-CA" sz="3900" kern="1200"/>
+            <a:t>Method Base Authentication with Annotation</a:t>
+          </a:r>
+          <a:endParaRPr lang="en-US" sz="3900" kern="1200"/>
+        </a:p>
+      </dsp:txBody>
+      <dsp:txXfrm>
+        <a:off x="79319" y="3798740"/>
+        <a:ext cx="6086627" cy="1466217"/>
+      </dsp:txXfrm>
+    </dsp:sp>
+  </dsp:spTree>
+</dsp:drawing>
+</file>
+
+<file path=ppt/diagrams/layout1.xml><?xml version="1.0" encoding="utf-8"?>
+<dgm:layoutDef xmlns:dgm="http://schemas.openxmlformats.org/drawingml/2006/diagram" xmlns:a="http://schemas.openxmlformats.org/drawingml/2006/main" uniqueId="urn:microsoft.com/office/officeart/2005/8/layout/vList2">
+  <dgm:title val=""/>
+  <dgm:desc val=""/>
+  <dgm:catLst>
+    <dgm:cat type="list" pri="3000"/>
+    <dgm:cat type="convert" pri="1000"/>
+  </dgm:catLst>
+  <dgm:sampData>
+    <dgm:dataModel>
+      <dgm:ptLst>
+        <dgm:pt modelId="0" type="doc"/>
+        <dgm:pt modelId="1">
+          <dgm:prSet phldr="1"/>
+        </dgm:pt>
+        <dgm:pt modelId="11">
+          <dgm:prSet phldr="1"/>
+        </dgm:pt>
+        <dgm:pt modelId="2">
+          <dgm:prSet phldr="1"/>
+        </dgm:pt>
+        <dgm:pt modelId="21">
+          <dgm:prSet phldr="1"/>
+        </dgm:pt>
+      </dgm:ptLst>
+      <dgm:cxnLst>
+        <dgm:cxn modelId="4" srcId="0" destId="1" srcOrd="0" destOrd="0"/>
+        <dgm:cxn modelId="5" srcId="0" destId="2" srcOrd="1" destOrd="0"/>
+        <dgm:cxn modelId="12" srcId="1" destId="11" srcOrd="0" destOrd="0"/>
+        <dgm:cxn modelId="23" srcId="2" destId="21" srcOrd="0" destOrd="0"/>
+      </dgm:cxnLst>
+      <dgm:bg/>
+      <dgm:whole/>
+    </dgm:dataModel>
+  </dgm:sampData>
+  <dgm:styleData>
+    <dgm:dataModel>
+      <dgm:ptLst>
+        <dgm:pt modelId="0" type="doc"/>
+        <dgm:pt modelId="1"/>
+        <dgm:pt modelId="2"/>
+      </dgm:ptLst>
+      <dgm:cxnLst>
+        <dgm:cxn modelId="3" srcId="0" destId="1" srcOrd="0" destOrd="0"/>
+        <dgm:cxn modelId="4" srcId="0" destId="2" srcOrd="1" destOrd="0"/>
+      </dgm:cxnLst>
+      <dgm:bg/>
+      <dgm:whole/>
+    </dgm:dataModel>
+  </dgm:styleData>
+  <dgm:clrData>
+    <dgm:dataModel>
+      <dgm:ptLst>
+        <dgm:pt modelId="0" type="doc"/>
+        <dgm:pt modelId="1"/>
+        <dgm:pt modelId="2"/>
+        <dgm:pt modelId="3"/>
+        <dgm:pt modelId="4"/>
+      </dgm:ptLst>
+      <dgm:cxnLst>
+        <dgm:cxn modelId="5" srcId="0" destId="1" srcOrd="0" destOrd="0"/>
+        <dgm:cxn modelId="6" srcId="0" destId="2" srcOrd="1" destOrd="0"/>
+        <dgm:cxn modelId="7" srcId="0" destId="3" srcOrd="2" destOrd="0"/>
+        <dgm:cxn modelId="8" srcId="0" destId="4" srcOrd="3" destOrd="0"/>
+      </dgm:cxnLst>
+      <dgm:bg/>
+      <dgm:whole/>
+    </dgm:dataModel>
+  </dgm:clrData>
+  <dgm:layoutNode name="linear">
+    <dgm:varLst>
+      <dgm:animLvl val="lvl"/>
+      <dgm:resizeHandles val="exact"/>
+    </dgm:varLst>
+    <dgm:alg type="lin">
+      <dgm:param type="linDir" val="fromT"/>
+      <dgm:param type="vertAlign" val="mid"/>
+    </dgm:alg>
+    <dgm:shape xmlns:r="http://schemas.openxmlformats.org/officeDocument/2006/relationships" r:blip="">
+      <dgm:adjLst/>
+    </dgm:shape>
+    <dgm:presOf/>
+    <dgm:constrLst>
+      <dgm:constr type="w" for="ch" forName="parentText" refType="w"/>
+      <dgm:constr type="h" for="ch" forName="parentText" refType="primFontSz" refFor="ch" refForName="parentText" fact="0.52"/>
+      <dgm:constr type="w" for="ch" forName="childText" refType="w"/>
+      <dgm:constr type="h" for="ch" forName="childText" refType="primFontSz" refFor="ch" refForName="parentText" fact="0.46"/>
+      <dgm:constr type="h" for="ch" forName="parentText" op="equ"/>
+      <dgm:constr type="primFontSz" for="ch" forName="parentText" op="equ" val="65"/>
+      <dgm:constr type="primFontSz" for="ch" forName="childText" refType="primFontSz" refFor="ch" refForName="parentText" op="equ"/>
+      <dgm:constr type="h" for="ch" forName="spacer" refType="primFontSz" refFor="ch" refForName="parentText" fact="0.08"/>
+    </dgm:constrLst>
+    <dgm:ruleLst>
+      <dgm:rule type="primFontSz" for="ch" forName="parentText" val="5" fact="NaN" max="NaN"/>
+    </dgm:ruleLst>
+    <dgm:forEach name="Name0" axis="ch" ptType="node">
+      <dgm:layoutNode name="parentText" styleLbl="node1">
+        <dgm:varLst>
+          <dgm:chMax val="0"/>
+          <dgm:bulletEnabled val="1"/>
+        </dgm:varLst>
+        <dgm:alg type="tx">
+          <dgm:param type="parTxLTRAlign" val="l"/>
+          <dgm:param type="parTxRTLAlign" val="r"/>
+        </dgm:alg>
+        <dgm:shape xmlns:r="http://schemas.openxmlformats.org/officeDocument/2006/relationships" type="roundRect" r:blip="">
+          <dgm:adjLst/>
+        </dgm:shape>
+        <dgm:presOf axis="self"/>
+        <dgm:constrLst>
+          <dgm:constr type="tMarg" refType="primFontSz" fact="0.3"/>
+          <dgm:constr type="bMarg" refType="primFontSz" fact="0.3"/>
+          <dgm:constr type="lMarg" refType="primFontSz" fact="0.3"/>
+          <dgm:constr type="rMarg" refType="primFontSz" fact="0.3"/>
+        </dgm:constrLst>
+        <dgm:ruleLst>
+          <dgm:rule type="h" val="INF" fact="NaN" max="NaN"/>
+        </dgm:ruleLst>
+      </dgm:layoutNode>
+      <dgm:choose name="Name1">
+        <dgm:if name="Name2" axis="ch" ptType="node" func="cnt" op="gte" val="1">
+          <dgm:layoutNode name="childText" styleLbl="revTx">
+            <dgm:varLst>
+              <dgm:bulletEnabled val="1"/>
+            </dgm:varLst>
+            <dgm:alg type="tx">
+              <dgm:param type="stBulletLvl" val="1"/>
+              <dgm:param type="lnSpAfChP" val="20"/>
+            </dgm:alg>
+            <dgm:shape xmlns:r="http://schemas.openxmlformats.org/officeDocument/2006/relationships" type="rect" r:blip="">
+              <dgm:adjLst/>
+            </dgm:shape>
+            <dgm:presOf axis="des" ptType="node"/>
+            <dgm:constrLst>
+              <dgm:constr type="tMarg" refType="primFontSz" fact="0.1"/>
+              <dgm:constr type="bMarg" refType="primFontSz" fact="0.1"/>
+              <dgm:constr type="lMarg" refType="w" fact="0.09"/>
+            </dgm:constrLst>
+            <dgm:ruleLst>
+              <dgm:rule type="h" val="INF" fact="NaN" max="NaN"/>
+            </dgm:ruleLst>
+          </dgm:layoutNode>
+        </dgm:if>
+        <dgm:else name="Name3">
+          <dgm:choose name="Name4">
+            <dgm:if name="Name5" axis="par ch" ptType="doc node" func="cnt" op="gte" val="2">
+              <dgm:forEach name="Name6" axis="followSib" ptType="sibTrans" cnt="1">
+                <dgm:layoutNode name="spacer">
+                  <dgm:alg type="sp"/>
+                  <dgm:shape xmlns:r="http://schemas.openxmlformats.org/officeDocument/2006/relationships" r:blip="">
+                    <dgm:adjLst/>
+                  </dgm:shape>
+                  <dgm:presOf/>
+                  <dgm:constrLst/>
+                  <dgm:ruleLst/>
+                </dgm:layoutNode>
+              </dgm:forEach>
+            </dgm:if>
+            <dgm:else name="Name7"/>
+          </dgm:choose>
+        </dgm:else>
+      </dgm:choose>
+    </dgm:forEach>
+  </dgm:layoutNode>
+</dgm:layoutDef>
+</file>
+
+<file path=ppt/diagrams/quickStyle1.xml><?xml version="1.0" encoding="utf-8"?>
+<dgm:styleDef xmlns:dgm="http://schemas.openxmlformats.org/drawingml/2006/diagram" xmlns:a="http://schemas.openxmlformats.org/drawingml/2006/main" uniqueId="urn:microsoft.com/office/officeart/2005/8/quickstyle/simple1">
+  <dgm:title val=""/>
+  <dgm:desc val=""/>
+  <dgm:catLst>
+    <dgm:cat type="simple" pri="10100"/>
+  </dgm:catLst>
+  <dgm:scene3d>
+    <a:camera prst="orthographicFront"/>
+    <a:lightRig rig="threePt" dir="t"/>
+  </dgm:scene3d>
+  <dgm:styleLbl name="node0">
+    <dgm:scene3d>
+      <a:camera prst="orthographicFront"/>
+      <a:lightRig rig="threePt" dir="t"/>
+    </dgm:scene3d>
+    <dgm:sp3d/>
+    <dgm:txPr/>
+    <dgm:style>
+      <a:lnRef idx="2">
+        <a:scrgbClr r="0" g="0" b="0"/>
+      </a:lnRef>
+      <a:fillRef idx="1">
+        <a:scrgbClr r="0" g="0" b="0"/>
+      </a:fillRef>
+      <a:effectRef idx="0">
+        <a:scrgbClr r="0" g="0" b="0"/>
+      </a:effectRef>
+      <a:fontRef idx="minor">
+        <a:schemeClr val="lt1"/>
+      </a:fontRef>
+    </dgm:style>
+  </dgm:styleLbl>
+  <dgm:styleLbl name="lnNode1">
+    <dgm:scene3d>
+      <a:camera prst="orthographicFront"/>
+      <a:lightRig rig="threePt" dir="t"/>
+    </dgm:scene3d>
+    <dgm:sp3d/>
+    <dgm:txPr/>
+    <dgm:style>
+      <a:lnRef idx="2">
+        <a:scrgbClr r="0" g="0" b="0"/>
+      </a:lnRef>
+      <a:fillRef idx="1">
+        <a:scrgbClr r="0" g="0" b="0"/>
+      </a:fillRef>
+      <a:effectRef idx="0">
+        <a:scrgbClr r="0" g="0" b="0"/>
+      </a:effectRef>
+      <a:fontRef idx="minor">
+        <a:schemeClr val="lt1"/>
+      </a:fontRef>
+    </dgm:style>
+  </dgm:styleLbl>
+  <dgm:styleLbl name="vennNode1">
+    <dgm:scene3d>
+      <a:camera prst="orthographicFront"/>
+      <a:lightRig rig="threePt" dir="t"/>
+    </dgm:scene3d>
+    <dgm:sp3d/>
+    <dgm:txPr/>
+    <dgm:style>
+      <a:lnRef idx="2">
+        <a:scrgbClr r="0" g="0" b="0"/>
+      </a:lnRef>
+      <a:fillRef idx="1">
+        <a:scrgbClr r="0" g="0" b="0"/>
+      </a:fillRef>
+      <a:effectRef idx="0">
+        <a:scrgbClr r="0" g="0" b="0"/>
+      </a:effectRef>
+      <a:fontRef idx="minor">
+        <a:schemeClr val="tx1"/>
+      </a:fontRef>
+    </dgm:style>
+  </dgm:styleLbl>
+  <dgm:styleLbl name="alignNode1">
+    <dgm:scene3d>
+      <a:camera prst="orthographicFront"/>
+      <a:lightRig rig="threePt" dir="t"/>
+    </dgm:scene3d>
+    <dgm:sp3d/>
+    <dgm:txPr/>
+    <dgm:style>
+      <a:lnRef idx="2">
+        <a:scrgbClr r="0" g="0" b="0"/>
+      </a:lnRef>
+      <a:fillRef idx="1">
+        <a:scrgbClr r="0" g="0" b="0"/>
+      </a:fillRef>
+      <a:effectRef idx="0">
+        <a:scrgbClr r="0" g="0" b="0"/>
+      </a:effectRef>
+      <a:fontRef idx="minor">
+        <a:schemeClr val="lt1"/>
+      </a:fontRef>
+    </dgm:style>
+  </dgm:styleLbl>
+  <dgm:styleLbl name="node1">
+    <dgm:scene3d>
+      <a:camera prst="orthographicFront"/>
+      <a:lightRig rig="threePt" dir="t"/>
+    </dgm:scene3d>
+    <dgm:sp3d/>
+    <dgm:txPr/>
+    <dgm:style>
+      <a:lnRef idx="2">
+        <a:scrgbClr r="0" g="0" b="0"/>
+      </a:lnRef>
+      <a:fillRef idx="1">
+        <a:scrgbClr r="0" g="0" b="0"/>
+      </a:fillRef>
+      <a:effectRef idx="0">
+        <a:scrgbClr r="0" g="0" b="0"/>
+      </a:effectRef>
+      <a:fontRef idx="minor">
+        <a:schemeClr val="lt1"/>
+      </a:fontRef>
+    </dgm:style>
+  </dgm:styleLbl>
+  <dgm:styleLbl name="node2">
+    <dgm:scene3d>
+      <a:camera prst="orthographicFront"/>
+      <a:lightRig rig="threePt" dir="t"/>
+    </dgm:scene3d>
+    <dgm:sp3d/>
+    <dgm:txPr/>
+    <dgm:style>
+      <a:lnRef idx="2">
+        <a:scrgbClr r="0" g="0" b="0"/>
+      </a:lnRef>
+      <a:fillRef idx="1">
+        <a:scrgbClr r="0" g="0" b="0"/>
+      </a:fillRef>
+      <a:effectRef idx="0">
+        <a:scrgbClr r="0" g="0" b="0"/>
+      </a:effectRef>
+      <a:fontRef idx="minor">
+        <a:schemeClr val="lt1"/>
+      </a:fontRef>
+    </dgm:style>
+  </dgm:styleLbl>
+  <dgm:styleLbl name="node3">
+    <dgm:scene3d>
+      <a:camera prst="orthographicFront"/>
+      <a:lightRig rig="threePt" dir="t"/>
+    </dgm:scene3d>
+    <dgm:sp3d/>
+    <dgm:txPr/>
+    <dgm:style>
+      <a:lnRef idx="2">
+        <a:scrgbClr r="0" g="0" b="0"/>
+      </a:lnRef>
+      <a:fillRef idx="1">
+        <a:scrgbClr r="0" g="0" b="0"/>
+      </a:fillRef>
+      <a:effectRef idx="0">
+        <a:scrgbClr r="0" g="0" b="0"/>
+      </a:effectRef>
+      <a:fontRef idx="minor">
+        <a:schemeClr val="lt1"/>
+      </a:fontRef>
+    </dgm:style>
+  </dgm:styleLbl>
+  <dgm:styleLbl name="node4">
+    <dgm:scene3d>
+      <a:camera prst="orthographicFront"/>
+      <a:lightRig rig="threePt" dir="t"/>
+    </dgm:scene3d>
+    <dgm:sp3d/>
+    <dgm:txPr/>
+    <dgm:style>
+      <a:lnRef idx="2">
+        <a:scrgbClr r="0" g="0" b="0"/>
+      </a:lnRef>
+      <a:fillRef idx="1">
+        <a:scrgbClr r="0" g="0" b="0"/>
+      </a:fillRef>
+      <a:effectRef idx="0">
+        <a:scrgbClr r="0" g="0" b="0"/>
+      </a:effectRef>
+      <a:fontRef idx="minor">
+        <a:schemeClr val="lt1"/>
+      </a:fontRef>
+    </dgm:style>
+  </dgm:styleLbl>
+  <dgm:styleLbl name="fgImgPlace1">
+    <dgm:scene3d>
+      <a:camera prst="orthographicFront"/>
+      <a:lightRig rig="threePt" dir="t"/>
+    </dgm:scene3d>
+    <dgm:sp3d/>
+    <dgm:txPr/>
+    <dgm:style>
+      <a:lnRef idx="2">
+        <a:scrgbClr r="0" g="0" b="0"/>
+      </a:lnRef>
+      <a:fillRef idx="1">
+        <a:scrgbClr r="0" g="0" b="0"/>
+      </a:fillRef>
+      <a:effectRef idx="0">
+        <a:scrgbClr r="0" g="0" b="0"/>
+      </a:effectRef>
+      <a:fontRef idx="minor"/>
+    </dgm:style>
+  </dgm:styleLbl>
+  <dgm:styleLbl name="alignImgPlace1">
+    <dgm:scene3d>
+      <a:camera prst="orthographicFront"/>
+      <a:lightRig rig="threePt" dir="t"/>
+    </dgm:scene3d>
+    <dgm:sp3d/>
+    <dgm:txPr/>
+    <dgm:style>
+      <a:lnRef idx="2">
+        <a:scrgbClr r="0" g="0" b="0"/>
+      </a:lnRef>
+      <a:fillRef idx="1">
+        <a:scrgbClr r="0" g="0" b="0"/>
+      </a:fillRef>
+      <a:effectRef idx="0">
+        <a:scrgbClr r="0" g="0" b="0"/>
+      </a:effectRef>
+      <a:fontRef idx="minor"/>
+    </dgm:style>
+  </dgm:styleLbl>
+  <dgm:styleLbl name="bgImgPlace1">
+    <dgm:scene3d>
+      <a:camera prst="orthographicFront"/>
+      <a:lightRig rig="threePt" dir="t"/>
+    </dgm:scene3d>
+    <dgm:sp3d/>
+    <dgm:txPr/>
+    <dgm:style>
+      <a:lnRef idx="2">
+        <a:scrgbClr r="0" g="0" b="0"/>
+      </a:lnRef>
+      <a:fillRef idx="1">
+        <a:scrgbClr r="0" g="0" b="0"/>
+      </a:fillRef>
+      <a:effectRef idx="0">
+        <a:scrgbClr r="0" g="0" b="0"/>
+      </a:effectRef>
+      <a:fontRef idx="minor"/>
+    </dgm:style>
+  </dgm:styleLbl>
+  <dgm:styleLbl name="sibTrans2D1">
+    <dgm:scene3d>
+      <a:camera prst="orthographicFront"/>
+      <a:lightRig rig="threePt" dir="t"/>
+    </dgm:scene3d>
+    <dgm:sp3d/>
+    <dgm:txPr/>
+    <dgm:style>
+      <a:lnRef idx="0">
+        <a:scrgbClr r="0" g="0" b="0"/>
+      </a:lnRef>
+      <a:fillRef idx="1">
+        <a:scrgbClr r="0" g="0" b="0"/>
+      </a:fillRef>
+      <a:effectRef idx="0">
+        <a:scrgbClr r="0" g="0" b="0"/>
+      </a:effectRef>
+      <a:fontRef idx="minor">
+        <a:schemeClr val="lt1"/>
+      </a:fontRef>
+    </dgm:style>
+  </dgm:styleLbl>
+  <dgm:styleLbl name="fgSibTrans2D1">
+    <dgm:scene3d>
+      <a:camera prst="orthographicFront"/>
+      <a:lightRig rig="threePt" dir="t"/>
+    </dgm:scene3d>
+    <dgm:sp3d/>
+    <dgm:txPr/>
+    <dgm:style>
+      <a:lnRef idx="0">
+        <a:scrgbClr r="0" g="0" b="0"/>
+      </a:lnRef>
+      <a:fillRef idx="1">
+        <a:scrgbClr r="0" g="0" b="0"/>
+      </a:fillRef>
+      <a:effectRef idx="0">
+        <a:scrgbClr r="0" g="0" b="0"/>
+      </a:effectRef>
+      <a:fontRef idx="minor">
+        <a:schemeClr val="lt1"/>
+      </a:fontRef>
+    </dgm:style>
+  </dgm:styleLbl>
+  <dgm:styleLbl name="bgSibTrans2D1">
+    <dgm:scene3d>
+      <a:camera prst="orthographicFront"/>
+      <a:lightRig rig="threePt" dir="t"/>
+    </dgm:scene3d>
+    <dgm:sp3d/>
+    <dgm:txPr/>
+    <dgm:style>
+      <a:lnRef idx="0">
+        <a:scrgbClr r="0" g="0" b="0"/>
+      </a:lnRef>
+      <a:fillRef idx="1">
+        <a:scrgbClr r="0" g="0" b="0"/>
+      </a:fillRef>
+      <a:effectRef idx="0">
+        <a:scrgbClr r="0" g="0" b="0"/>
+      </a:effectRef>
+      <a:fontRef idx="minor">
+        <a:schemeClr val="lt1"/>
+      </a:fontRef>
+    </dgm:style>
+  </dgm:styleLbl>
+  <dgm:styleLbl name="sibTrans1D1">
+    <dgm:scene3d>
+      <a:camera prst="orthographicFront"/>
+      <a:lightRig rig="threePt" dir="t"/>
+    </dgm:scene3d>
+    <dgm:sp3d/>
+    <dgm:txPr/>
+    <dgm:style>
+      <a:lnRef idx="1">
+        <a:scrgbClr r="0" g="0" b="0"/>
+      </a:lnRef>
+      <a:fillRef idx="0">
+        <a:scrgbClr r="0" g="0" b="0"/>
+      </a:fillRef>
+      <a:effectRef idx="0">
+        <a:scrgbClr r="0" g="0" b="0"/>
+      </a:effectRef>
+      <a:fontRef idx="minor"/>
+    </dgm:style>
+  </dgm:styleLbl>
+  <dgm:styleLbl name="callout">
+    <dgm:scene3d>
+      <a:camera prst="orthographicFront"/>
+      <a:lightRig rig="threePt" dir="t"/>
+    </dgm:scene3d>
+    <dgm:sp3d/>
+    <dgm:txPr/>
+    <dgm:style>
+      <a:lnRef idx="2">
+        <a:scrgbClr r="0" g="0" b="0"/>
+      </a:lnRef>
+      <a:fillRef idx="1">
+        <a:scrgbClr r="0" g="0" b="0"/>
+      </a:fillRef>
+      <a:effectRef idx="0">
+        <a:scrgbClr r="0" g="0" b="0"/>
+      </a:effectRef>
+      <a:fontRef idx="minor"/>
+    </dgm:style>
+  </dgm:styleLbl>
+  <dgm:styleLbl name="asst0">
+    <dgm:scene3d>
+      <a:camera prst="orthographicFront"/>
+      <a:lightRig rig="threePt" dir="t"/>
+    </dgm:scene3d>
+    <dgm:sp3d/>
+    <dgm:txPr/>
+    <dgm:style>
+      <a:lnRef idx="2">
+        <a:scrgbClr r="0" g="0" b="0"/>
+      </a:lnRef>
+      <a:fillRef idx="1">
+        <a:scrgbClr r="0" g="0" b="0"/>
+      </a:fillRef>
+      <a:effectRef idx="0">
+        <a:scrgbClr r="0" g="0" b="0"/>
+      </a:effectRef>
+      <a:fontRef idx="minor">
+        <a:schemeClr val="lt1"/>
+      </a:fontRef>
+    </dgm:style>
+  </dgm:styleLbl>
+  <dgm:styleLbl name="asst1">
+    <dgm:scene3d>
+      <a:camera prst="orthographicFront"/>
+      <a:lightRig rig="threePt" dir="t"/>
+    </dgm:scene3d>
+    <dgm:sp3d/>
+    <dgm:txPr/>
+    <dgm:style>
+      <a:lnRef idx="2">
+        <a:scrgbClr r="0" g="0" b="0"/>
+      </a:lnRef>
+      <a:fillRef idx="1">
+        <a:scrgbClr r="0" g="0" b="0"/>
+      </a:fillRef>
+      <a:effectRef idx="0">
+        <a:scrgbClr r="0" g="0" b="0"/>
+      </a:effectRef>
+      <a:fontRef idx="minor">
+        <a:schemeClr val="lt1"/>
+      </a:fontRef>
+    </dgm:style>
+  </dgm:styleLbl>
+  <dgm:styleLbl name="asst2">
+    <dgm:scene3d>
+      <a:camera prst="orthographicFront"/>
+      <a:lightRig rig="threePt" dir="t"/>
+    </dgm:scene3d>
+    <dgm:sp3d/>
+    <dgm:txPr/>
+    <dgm:style>
+      <a:lnRef idx="2">
+        <a:scrgbClr r="0" g="0" b="0"/>
+      </a:lnRef>
+      <a:fillRef idx="1">
+        <a:scrgbClr r="0" g="0" b="0"/>
+      </a:fillRef>
+      <a:effectRef idx="0">
+        <a:scrgbClr r="0" g="0" b="0"/>
+      </a:effectRef>
+      <a:fontRef idx="minor">
+        <a:schemeClr val="lt1"/>
+      </a:fontRef>
+    </dgm:style>
+  </dgm:styleLbl>
+  <dgm:styleLbl name="asst3">
+    <dgm:scene3d>
+      <a:camera prst="orthographicFront"/>
+      <a:lightRig rig="threePt" dir="t"/>
+    </dgm:scene3d>
+    <dgm:sp3d/>
+    <dgm:txPr/>
+    <dgm:style>
+      <a:lnRef idx="2">
+        <a:scrgbClr r="0" g="0" b="0"/>
+      </a:lnRef>
+      <a:fillRef idx="1">
+        <a:scrgbClr r="0" g="0" b="0"/>
+      </a:fillRef>
+      <a:effectRef idx="0">
+        <a:scrgbClr r="0" g="0" b="0"/>
+      </a:effectRef>
+      <a:fontRef idx="minor">
+        <a:schemeClr val="lt1"/>
+      </a:fontRef>
+    </dgm:style>
+  </dgm:styleLbl>
+  <dgm:styleLbl name="asst4">
+    <dgm:scene3d>
+      <a:camera prst="orthographicFront"/>
+      <a:lightRig rig="threePt" dir="t"/>
+    </dgm:scene3d>
+    <dgm:sp3d/>
+    <dgm:txPr/>
+    <dgm:style>
+      <a:lnRef idx="2">
+        <a:scrgbClr r="0" g="0" b="0"/>
+      </a:lnRef>
+      <a:fillRef idx="1">
+        <a:scrgbClr r="0" g="0" b="0"/>
+      </a:fillRef>
+      <a:effectRef idx="0">
+        <a:scrgbClr r="0" g="0" b="0"/>
+      </a:effectRef>
+      <a:fontRef idx="minor">
+        <a:schemeClr val="lt1"/>
+      </a:fontRef>
+    </dgm:style>
+  </dgm:styleLbl>
+  <dgm:styleLbl name="parChTrans2D1">
+    <dgm:scene3d>
+      <a:camera prst="orthographicFront"/>
+      <a:lightRig rig="threePt" dir="t"/>
+    </dgm:scene3d>
+    <dgm:sp3d/>
+    <dgm:txPr/>
+    <dgm:style>
+      <a:lnRef idx="2">
+        <a:scrgbClr r="0" g="0" b="0"/>
+      </a:lnRef>
+      <a:fillRef idx="1">
+        <a:scrgbClr r="0" g="0" b="0"/>
+      </a:fillRef>
+      <a:effectRef idx="0">
+        <a:scrgbClr r="0" g="0" b="0"/>
+      </a:effectRef>
+      <a:fontRef idx="minor">
+        <a:schemeClr val="lt1"/>
+      </a:fontRef>
+    </dgm:style>
+  </dgm:styleLbl>
+  <dgm:styleLbl name="parChTrans2D2">
+    <dgm:scene3d>
+      <a:camera prst="orthographicFront"/>
+      <a:lightRig rig="threePt" dir="t"/>
+    </dgm:scene3d>
+    <dgm:sp3d/>
+    <dgm:txPr/>
+    <dgm:style>
+      <a:lnRef idx="2">
+        <a:scrgbClr r="0" g="0" b="0"/>
+      </a:lnRef>
+      <a:fillRef idx="1">
+        <a:scrgbClr r="0" g="0" b="0"/>
+      </a:fillRef>
+      <a:effectRef idx="0">
+        <a:scrgbClr r="0" g="0" b="0"/>
+      </a:effectRef>
+      <a:fontRef idx="minor">
+        <a:schemeClr val="lt1"/>
+      </a:fontRef>
+    </dgm:style>
+  </dgm:styleLbl>
+  <dgm:styleLbl name="parChTrans2D3">
+    <dgm:scene3d>
+      <a:camera prst="orthographicFront"/>
+      <a:lightRig rig="threePt" dir="t"/>
+    </dgm:scene3d>
+    <dgm:sp3d/>
+    <dgm:txPr/>
+    <dgm:style>
+      <a:lnRef idx="2">
+        <a:scrgbClr r="0" g="0" b="0"/>
+      </a:lnRef>
+      <a:fillRef idx="1">
+        <a:scrgbClr r="0" g="0" b="0"/>
+      </a:fillRef>
+      <a:effectRef idx="0">
+        <a:scrgbClr r="0" g="0" b="0"/>
+      </a:effectRef>
+      <a:fontRef idx="minor">
+        <a:schemeClr val="lt1"/>
+      </a:fontRef>
+    </dgm:style>
+  </dgm:styleLbl>
+  <dgm:styleLbl name="parChTrans2D4">
+    <dgm:scene3d>
+      <a:camera prst="orthographicFront"/>
+      <a:lightRig rig="threePt" dir="t"/>
+    </dgm:scene3d>
+    <dgm:sp3d/>
+    <dgm:txPr/>
+    <dgm:style>
+      <a:lnRef idx="2">
+        <a:scrgbClr r="0" g="0" b="0"/>
+      </a:lnRef>
+      <a:fillRef idx="1">
+        <a:scrgbClr r="0" g="0" b="0"/>
+      </a:fillRef>
+      <a:effectRef idx="0">
+        <a:scrgbClr r="0" g="0" b="0"/>
+      </a:effectRef>
+      <a:fontRef idx="minor">
+        <a:schemeClr val="lt1"/>
+      </a:fontRef>
+    </dgm:style>
+  </dgm:styleLbl>
+  <dgm:styleLbl name="parChTrans1D1">
+    <dgm:scene3d>
+      <a:camera prst="orthographicFront"/>
+      <a:lightRig rig="threePt" dir="t"/>
+    </dgm:scene3d>
+    <dgm:sp3d/>
+    <dgm:txPr/>
+    <dgm:style>
+      <a:lnRef idx="2">
+        <a:scrgbClr r="0" g="0" b="0"/>
+      </a:lnRef>
+      <a:fillRef idx="0">
+        <a:scrgbClr r="0" g="0" b="0"/>
+      </a:fillRef>
+      <a:effectRef idx="0">
+        <a:scrgbClr r="0" g="0" b="0"/>
+      </a:effectRef>
+      <a:fontRef idx="minor"/>
+    </dgm:style>
+  </dgm:styleLbl>
+  <dgm:styleLbl name="parChTrans1D2">
+    <dgm:scene3d>
+      <a:camera prst="orthographicFront"/>
+      <a:lightRig rig="threePt" dir="t"/>
+    </dgm:scene3d>
+    <dgm:sp3d/>
+    <dgm:txPr/>
+    <dgm:style>
+      <a:lnRef idx="2">
+        <a:scrgbClr r="0" g="0" b="0"/>
+      </a:lnRef>
+      <a:fillRef idx="0">
+        <a:scrgbClr r="0" g="0" b="0"/>
+      </a:fillRef>
+      <a:effectRef idx="0">
+        <a:scrgbClr r="0" g="0" b="0"/>
+      </a:effectRef>
+      <a:fontRef idx="minor"/>
+    </dgm:style>
+  </dgm:styleLbl>
+  <dgm:styleLbl name="parChTrans1D3">
+    <dgm:scene3d>
+      <a:camera prst="orthographicFront"/>
+      <a:lightRig rig="threePt" dir="t"/>
+    </dgm:scene3d>
+    <dgm:sp3d/>
+    <dgm:txPr/>
+    <dgm:style>
+      <a:lnRef idx="2">
+        <a:scrgbClr r="0" g="0" b="0"/>
+      </a:lnRef>
+      <a:fillRef idx="0">
+        <a:scrgbClr r="0" g="0" b="0"/>
+      </a:fillRef>
+      <a:effectRef idx="0">
+        <a:scrgbClr r="0" g="0" b="0"/>
+      </a:effectRef>
+      <a:fontRef idx="minor"/>
+    </dgm:style>
+  </dgm:styleLbl>
+  <dgm:styleLbl name="parChTrans1D4">
+    <dgm:scene3d>
+      <a:camera prst="orthographicFront"/>
+      <a:lightRig rig="threePt" dir="t"/>
+    </dgm:scene3d>
+    <dgm:sp3d/>
+    <dgm:txPr/>
+    <dgm:style>
+      <a:lnRef idx="2">
+        <a:scrgbClr r="0" g="0" b="0"/>
+      </a:lnRef>
+      <a:fillRef idx="0">
+        <a:scrgbClr r="0" g="0" b="0"/>
+      </a:fillRef>
+      <a:effectRef idx="0">
+        <a:scrgbClr r="0" g="0" b="0"/>
+      </a:effectRef>
+      <a:fontRef idx="minor"/>
+    </dgm:style>
+  </dgm:styleLbl>
+  <dgm:styleLbl name="fgAcc1">
+    <dgm:scene3d>
+      <a:camera prst="orthographicFront"/>
+      <a:lightRig rig="threePt" dir="t"/>
+    </dgm:scene3d>
+    <dgm:sp3d/>
+    <dgm:txPr/>
+    <dgm:style>
+      <a:lnRef idx="2">
+        <a:scrgbClr r="0" g="0" b="0"/>
+      </a:lnRef>
+      <a:fillRef idx="1">
+        <a:scrgbClr r="0" g="0" b="0"/>
+      </a:fillRef>
+      <a:effectRef idx="0">
+        <a:scrgbClr r="0" g="0" b="0"/>
+      </a:effectRef>
+      <a:fontRef idx="minor"/>
+    </dgm:style>
+  </dgm:styleLbl>
+  <dgm:styleLbl name="conFgAcc1">
+    <dgm:scene3d>
+      <a:camera prst="orthographicFront"/>
+      <a:lightRig rig="threePt" dir="t"/>
+    </dgm:scene3d>
+    <dgm:sp3d/>
+    <dgm:txPr/>
+    <dgm:style>
+      <a:lnRef idx="2">
+        <a:scrgbClr r="0" g="0" b="0"/>
+      </a:lnRef>
+      <a:fillRef idx="1">
+        <a:scrgbClr r="0" g="0" b="0"/>
+      </a:fillRef>
+      <a:effectRef idx="0">
+        <a:scrgbClr r="0" g="0" b="0"/>
+      </a:effectRef>
+      <a:fontRef idx="minor"/>
+    </dgm:style>
+  </dgm:styleLbl>
+  <dgm:styleLbl name="alignAcc1">
+    <dgm:scene3d>
+      <a:camera prst="orthographicFront"/>
+      <a:lightRig rig="threePt" dir="t"/>
+    </dgm:scene3d>
+    <dgm:sp3d/>
+    <dgm:txPr/>
+    <dgm:style>
+      <a:lnRef idx="2">
+        <a:scrgbClr r="0" g="0" b="0"/>
+      </a:lnRef>
+      <a:fillRef idx="1">
+        <a:scrgbClr r="0" g="0" b="0"/>
+      </a:fillRef>
+      <a:effectRef idx="0">
+        <a:scrgbClr r="0" g="0" b="0"/>
+      </a:effectRef>
+      <a:fontRef idx="minor"/>
+    </dgm:style>
+  </dgm:styleLbl>
+  <dgm:styleLbl name="trAlignAcc1">
+    <dgm:scene3d>
+      <a:camera prst="orthographicFront"/>
+      <a:lightRig rig="threePt" dir="t"/>
+    </dgm:scene3d>
+    <dgm:sp3d/>
+    <dgm:txPr/>
+    <dgm:style>
+      <a:lnRef idx="1">
+        <a:scrgbClr r="0" g="0" b="0"/>
+      </a:lnRef>
+      <a:fillRef idx="1">
+        <a:scrgbClr r="0" g="0" b="0"/>
+      </a:fillRef>
+      <a:effectRef idx="0">
+        <a:scrgbClr r="0" g="0" b="0"/>
+      </a:effectRef>
+      <a:fontRef idx="minor"/>
+    </dgm:style>
+  </dgm:styleLbl>
+  <dgm:styleLbl name="bgAcc1">
+    <dgm:scene3d>
+      <a:camera prst="orthographicFront"/>
+      <a:lightRig rig="threePt" dir="t"/>
+    </dgm:scene3d>
+    <dgm:sp3d/>
+    <dgm:txPr/>
+    <dgm:style>
+      <a:lnRef idx="2">
+        <a:scrgbClr r="0" g="0" b="0"/>
+      </a:lnRef>
+      <a:fillRef idx="1">
+        <a:scrgbClr r="0" g="0" b="0"/>
+      </a:fillRef>
+      <a:effectRef idx="0">
+        <a:scrgbClr r="0" g="0" b="0"/>
+      </a:effectRef>
+      <a:fontRef idx="minor"/>
+    </dgm:style>
+  </dgm:styleLbl>
+  <dgm:styleLbl name="solidFgAcc1">
+    <dgm:scene3d>
+      <a:camera prst="orthographicFront"/>
+      <a:lightRig rig="threePt" dir="t"/>
+    </dgm:scene3d>
+    <dgm:sp3d/>
+    <dgm:txPr/>
+    <dgm:style>
+      <a:lnRef idx="2">
+        <a:scrgbClr r="0" g="0" b="0"/>
+      </a:lnRef>
+      <a:fillRef idx="1">
+        <a:scrgbClr r="0" g="0" b="0"/>
+      </a:fillRef>
+      <a:effectRef idx="0">
+        <a:scrgbClr r="0" g="0" b="0"/>
+      </a:effectRef>
+      <a:fontRef idx="minor"/>
+    </dgm:style>
+  </dgm:styleLbl>
+  <dgm:styleLbl name="solidAlignAcc1">
+    <dgm:scene3d>
+      <a:camera prst="orthographicFront"/>
+      <a:lightRig rig="threePt" dir="t"/>
+    </dgm:scene3d>
+    <dgm:sp3d/>
+    <dgm:txPr/>
+    <dgm:style>
+      <a:lnRef idx="2">
+        <a:scrgbClr r="0" g="0" b="0"/>
+      </a:lnRef>
+      <a:fillRef idx="1">
+        <a:scrgbClr r="0" g="0" b="0"/>
+      </a:fillRef>
+      <a:effectRef idx="0">
+        <a:scrgbClr r="0" g="0" b="0"/>
+      </a:effectRef>
+      <a:fontRef idx="minor"/>
+    </dgm:style>
+  </dgm:styleLbl>
+  <dgm:styleLbl name="solidBgAcc1">
+    <dgm:scene3d>
+      <a:camera prst="orthographicFront"/>
+      <a:lightRig rig="threePt" dir="t"/>
+    </dgm:scene3d>
+    <dgm:sp3d/>
+    <dgm:txPr/>
+    <dgm:style>
+      <a:lnRef idx="2">
+        <a:scrgbClr r="0" g="0" b="0"/>
+      </a:lnRef>
+      <a:fillRef idx="1">
+        <a:scrgbClr r="0" g="0" b="0"/>
+      </a:fillRef>
+      <a:effectRef idx="0">
+        <a:scrgbClr r="0" g="0" b="0"/>
+      </a:effectRef>
+      <a:fontRef idx="minor"/>
+    </dgm:style>
+  </dgm:styleLbl>
+  <dgm:styleLbl name="fgAccFollowNode1">
+    <dgm:scene3d>
+      <a:camera prst="orthographicFront"/>
+      <a:lightRig rig="threePt" dir="t"/>
+    </dgm:scene3d>
+    <dgm:sp3d/>
+    <dgm:txPr/>
+    <dgm:style>
+      <a:lnRef idx="2">
+        <a:scrgbClr r="0" g="0" b="0"/>
+      </a:lnRef>
+      <a:fillRef idx="1">
+        <a:scrgbClr r="0" g="0" b="0"/>
+      </a:fillRef>
+      <a:effectRef idx="0">
+        <a:scrgbClr r="0" g="0" b="0"/>
+      </a:effectRef>
+      <a:fontRef idx="minor"/>
+    </dgm:style>
+  </dgm:styleLbl>
+  <dgm:styleLbl name="alignAccFollowNode1">
+    <dgm:scene3d>
+      <a:camera prst="orthographicFront"/>
+      <a:lightRig rig="threePt" dir="t"/>
+    </dgm:scene3d>
+    <dgm:sp3d/>
+    <dgm:txPr/>
+    <dgm:style>
+      <a:lnRef idx="2">
+        <a:scrgbClr r="0" g="0" b="0"/>
+      </a:lnRef>
+      <a:fillRef idx="1">
+        <a:scrgbClr r="0" g="0" b="0"/>
+      </a:fillRef>
+      <a:effectRef idx="0">
+        <a:scrgbClr r="0" g="0" b="0"/>
+      </a:effectRef>
+      <a:fontRef idx="minor"/>
+    </dgm:style>
+  </dgm:styleLbl>
+  <dgm:styleLbl name="bgAccFollowNode1">
+    <dgm:scene3d>
+      <a:camera prst="orthographicFront"/>
+      <a:lightRig rig="threePt" dir="t"/>
+    </dgm:scene3d>
+    <dgm:sp3d/>
+    <dgm:txPr/>
+    <dgm:style>
+      <a:lnRef idx="2">
+        <a:scrgbClr r="0" g="0" b="0"/>
+      </a:lnRef>
+      <a:fillRef idx="1">
+        <a:scrgbClr r="0" g="0" b="0"/>
+      </a:fillRef>
+      <a:effectRef idx="0">
+        <a:scrgbClr r="0" g="0" b="0"/>
+      </a:effectRef>
+      <a:fontRef idx="minor"/>
+    </dgm:style>
+  </dgm:styleLbl>
+  <dgm:styleLbl name="fgAcc0">
+    <dgm:scene3d>
+      <a:camera prst="orthographicFront"/>
+      <a:lightRig rig="threePt" dir="t"/>
+    </dgm:scene3d>
+    <dgm:sp3d/>
+    <dgm:txPr/>
+    <dgm:style>
+      <a:lnRef idx="2">
+        <a:scrgbClr r="0" g="0" b="0"/>
+      </a:lnRef>
+      <a:fillRef idx="1">
+        <a:scrgbClr r="0" g="0" b="0"/>
+      </a:fillRef>
+      <a:effectRef idx="0">
+        <a:scrgbClr r="0" g="0" b="0"/>
+      </a:effectRef>
+      <a:fontRef idx="minor"/>
+    </dgm:style>
+  </dgm:styleLbl>
+  <dgm:styleLbl name="fgAcc2">
+    <dgm:scene3d>
+      <a:camera prst="orthographicFront"/>
+      <a:lightRig rig="threePt" dir="t"/>
+    </dgm:scene3d>
+    <dgm:sp3d/>
+    <dgm:txPr/>
+    <dgm:style>
+      <a:lnRef idx="2">
+        <a:scrgbClr r="0" g="0" b="0"/>
+      </a:lnRef>
+      <a:fillRef idx="1">
+        <a:scrgbClr r="0" g="0" b="0"/>
+      </a:fillRef>
+      <a:effectRef idx="0">
+        <a:scrgbClr r="0" g="0" b="0"/>
+      </a:effectRef>
+      <a:fontRef idx="minor"/>
+    </dgm:style>
+  </dgm:styleLbl>
+  <dgm:styleLbl name="fgAcc3">
+    <dgm:scene3d>
+      <a:camera prst="orthographicFront"/>
+      <a:lightRig rig="threePt" dir="t"/>
+    </dgm:scene3d>
+    <dgm:sp3d/>
+    <dgm:txPr/>
+    <dgm:style>
+      <a:lnRef idx="2">
+        <a:scrgbClr r="0" g="0" b="0"/>
+      </a:lnRef>
+      <a:fillRef idx="1">
+        <a:scrgbClr r="0" g="0" b="0"/>
+      </a:fillRef>
+      <a:effectRef idx="0">
+        <a:scrgbClr r="0" g="0" b="0"/>
+      </a:effectRef>
+      <a:fontRef idx="minor"/>
+    </dgm:style>
+  </dgm:styleLbl>
+  <dgm:styleLbl name="fgAcc4">
+    <dgm:scene3d>
+      <a:camera prst="orthographicFront"/>
+      <a:lightRig rig="threePt" dir="t"/>
+    </dgm:scene3d>
+    <dgm:sp3d/>
+    <dgm:txPr/>
+    <dgm:style>
+      <a:lnRef idx="2">
+        <a:scrgbClr r="0" g="0" b="0"/>
+      </a:lnRef>
+      <a:fillRef idx="1">
+        <a:scrgbClr r="0" g="0" b="0"/>
+      </a:fillRef>
+      <a:effectRef idx="0">
+        <a:scrgbClr r="0" g="0" b="0"/>
+      </a:effectRef>
+      <a:fontRef idx="minor"/>
+    </dgm:style>
+  </dgm:styleLbl>
+  <dgm:styleLbl name="bgShp">
+    <dgm:scene3d>
+      <a:camera prst="orthographicFront"/>
+      <a:lightRig rig="threePt" dir="t"/>
+    </dgm:scene3d>
+    <dgm:sp3d/>
+    <dgm:txPr/>
+    <dgm:style>
+      <a:lnRef idx="0">
+        <a:scrgbClr r="0" g="0" b="0"/>
+      </a:lnRef>
+      <a:fillRef idx="1">
+        <a:scrgbClr r="0" g="0" b="0"/>
+      </a:fillRef>
+      <a:effectRef idx="0">
+        <a:scrgbClr r="0" g="0" b="0"/>
+      </a:effectRef>
+      <a:fontRef idx="minor"/>
+    </dgm:style>
+  </dgm:styleLbl>
+  <dgm:styleLbl name="dkBgShp">
+    <dgm:scene3d>
+      <a:camera prst="orthographicFront"/>
+      <a:lightRig rig="threePt" dir="t"/>
+    </dgm:scene3d>
+    <dgm:sp3d/>
+    <dgm:txPr/>
+    <dgm:style>
+      <a:lnRef idx="0">
+        <a:scrgbClr r="0" g="0" b="0"/>
+      </a:lnRef>
+      <a:fillRef idx="1">
+        <a:scrgbClr r="0" g="0" b="0"/>
+      </a:fillRef>
+      <a:effectRef idx="0">
+        <a:scrgbClr r="0" g="0" b="0"/>
+      </a:effectRef>
+      <a:fontRef idx="minor"/>
+    </dgm:style>
+  </dgm:styleLbl>
+  <dgm:styleLbl name="trBgShp">
+    <dgm:scene3d>
+      <a:camera prst="orthographicFront"/>
+      <a:lightRig rig="threePt" dir="t"/>
+    </dgm:scene3d>
+    <dgm:sp3d/>
+    <dgm:txPr/>
+    <dgm:style>
+      <a:lnRef idx="0">
+        <a:scrgbClr r="0" g="0" b="0"/>
+      </a:lnRef>
+      <a:fillRef idx="1">
+        <a:scrgbClr r="0" g="0" b="0"/>
+      </a:fillRef>
+      <a:effectRef idx="0">
+        <a:scrgbClr r="0" g="0" b="0"/>
+      </a:effectRef>
+      <a:fontRef idx="minor"/>
+    </dgm:style>
+  </dgm:styleLbl>
+  <dgm:styleLbl name="fgShp">
+    <dgm:scene3d>
+      <a:camera prst="orthographicFront"/>
+      <a:lightRig rig="threePt" dir="t"/>
+    </dgm:scene3d>
+    <dgm:sp3d/>
+    <dgm:txPr/>
+    <dgm:style>
+      <a:lnRef idx="2">
+        <a:scrgbClr r="0" g="0" b="0"/>
+      </a:lnRef>
+      <a:fillRef idx="1">
+        <a:scrgbClr r="0" g="0" b="0"/>
+      </a:fillRef>
+      <a:effectRef idx="0">
+        <a:scrgbClr r="0" g="0" b="0"/>
+      </a:effectRef>
+      <a:fontRef idx="minor"/>
+    </dgm:style>
+  </dgm:styleLbl>
+  <dgm:styleLbl name="revTx">
+    <dgm:scene3d>
+      <a:camera prst="orthographicFront"/>
+      <a:lightRig rig="threePt" dir="t"/>
+    </dgm:scene3d>
+    <dgm:sp3d/>
+    <dgm:txPr/>
+    <dgm:style>
+      <a:lnRef idx="0">
+        <a:scrgbClr r="0" g="0" b="0"/>
+      </a:lnRef>
+      <a:fillRef idx="0">
+        <a:scrgbClr r="0" g="0" b="0"/>
+      </a:fillRef>
+      <a:effectRef idx="0">
+        <a:scrgbClr r="0" g="0" b="0"/>
+      </a:effectRef>
+      <a:fontRef idx="minor"/>
+    </dgm:style>
+  </dgm:styleLbl>
+</dgm:styleDef>
 </file>
 
 <file path=ppt/slideLayouts/slideLayout1.xml><?xml version="1.0" encoding="utf-8"?>
@@ -6921,6 +9356,1726 @@
 </p:sld>
 </file>
 
+<file path=ppt/slides/slide5.xml><?xml version="1.0" encoding="utf-8"?>
+<p:sld xmlns:a="http://schemas.openxmlformats.org/drawingml/2006/main" xmlns:r="http://schemas.openxmlformats.org/officeDocument/2006/relationships" xmlns:p="http://schemas.openxmlformats.org/presentationml/2006/main">
+  <p:cSld>
+    <p:bg>
+      <p:bgPr>
+        <a:solidFill>
+          <a:schemeClr val="bg1"/>
+        </a:solidFill>
+        <a:effectLst/>
+      </p:bgPr>
+    </p:bg>
+    <p:spTree>
+      <p:nvGrpSpPr>
+        <p:cNvPr id="1" name=""/>
+        <p:cNvGrpSpPr/>
+        <p:nvPr/>
+      </p:nvGrpSpPr>
+      <p:grpSpPr>
+        <a:xfrm>
+          <a:off x="0" y="0"/>
+          <a:ext cx="0" cy="0"/>
+          <a:chOff x="0" y="0"/>
+          <a:chExt cx="0" cy="0"/>
+        </a:xfrm>
+      </p:grpSpPr>
+      <p:sp>
+        <p:nvSpPr>
+          <p:cNvPr id="9" name="Rectangle 8">
+            <a:extLst>
+              <a:ext uri="{FF2B5EF4-FFF2-40B4-BE49-F238E27FC236}">
+                <a16:creationId xmlns:a16="http://schemas.microsoft.com/office/drawing/2014/main" id="{383F4F3A-DF89-453C-A499-8C259F6A2F13}"/>
+              </a:ext>
+              <a:ext uri="{C183D7F6-B498-43B3-948B-1728B52AA6E4}">
+                <adec:decorative xmlns:adec="http://schemas.microsoft.com/office/drawing/2017/decorative" val="1"/>
+              </a:ext>
+            </a:extLst>
+          </p:cNvPr>
+          <p:cNvSpPr>
+            <a:spLocks noGrp="1" noRot="1" noChangeAspect="1" noMove="1" noResize="1" noEditPoints="1" noAdjustHandles="1" noChangeArrowheads="1" noChangeShapeType="1" noTextEdit="1"/>
+          </p:cNvSpPr>
+          <p:nvPr>
+            <p:extLst>
+              <p:ext uri="{386F3935-93C4-4BCD-93E2-E3B085C9AB24}">
+                <p16:designElem xmlns:p16="http://schemas.microsoft.com/office/powerpoint/2015/main" val="1"/>
+              </p:ext>
+            </p:extLst>
+          </p:nvPr>
+        </p:nvSpPr>
+        <p:spPr>
+          <a:xfrm>
+            <a:off x="0" y="0"/>
+            <a:ext cx="12192000" cy="6858000"/>
+          </a:xfrm>
+          <a:prstGeom prst="rect">
+            <a:avLst/>
+          </a:prstGeom>
+          <a:gradFill flip="none" rotWithShape="1">
+            <a:gsLst>
+              <a:gs pos="100000">
+                <a:schemeClr val="accent4"/>
+              </a:gs>
+              <a:gs pos="0">
+                <a:schemeClr val="accent2"/>
+              </a:gs>
+            </a:gsLst>
+            <a:lin ang="2700000" scaled="1"/>
+            <a:tileRect/>
+          </a:gradFill>
+          <a:ln>
+            <a:noFill/>
+          </a:ln>
+        </p:spPr>
+        <p:style>
+          <a:lnRef idx="2">
+            <a:schemeClr val="accent1">
+              <a:shade val="50000"/>
+            </a:schemeClr>
+          </a:lnRef>
+          <a:fillRef idx="1">
+            <a:schemeClr val="accent1"/>
+          </a:fillRef>
+          <a:effectRef idx="0">
+            <a:schemeClr val="accent1"/>
+          </a:effectRef>
+          <a:fontRef idx="minor">
+            <a:schemeClr val="lt1"/>
+          </a:fontRef>
+        </p:style>
+        <p:txBody>
+          <a:bodyPr rtlCol="0" anchor="ctr"/>
+          <a:lstStyle/>
+          <a:p>
+            <a:pPr algn="ctr"/>
+            <a:endParaRPr lang="en-US">
+              <a:solidFill>
+                <a:schemeClr val="bg1"/>
+              </a:solidFill>
+            </a:endParaRPr>
+          </a:p>
+        </p:txBody>
+      </p:sp>
+      <p:sp>
+        <p:nvSpPr>
+          <p:cNvPr id="2" name="Title 1">
+            <a:extLst>
+              <a:ext uri="{FF2B5EF4-FFF2-40B4-BE49-F238E27FC236}">
+                <a16:creationId xmlns:a16="http://schemas.microsoft.com/office/drawing/2014/main" id="{C8ADB819-6BE8-4A38-A2BE-BE576FEED5E3}"/>
+              </a:ext>
+            </a:extLst>
+          </p:cNvPr>
+          <p:cNvSpPr>
+            <a:spLocks noGrp="1"/>
+          </p:cNvSpPr>
+          <p:nvPr>
+            <p:ph type="title"/>
+          </p:nvPr>
+        </p:nvSpPr>
+        <p:spPr>
+          <a:xfrm>
+            <a:off x="479394" y="1062487"/>
+            <a:ext cx="3939688" cy="5583126"/>
+          </a:xfrm>
+        </p:spPr>
+        <p:txBody>
+          <a:bodyPr>
+            <a:normAutofit/>
+          </a:bodyPr>
+          <a:lstStyle/>
+          <a:p>
+            <a:pPr algn="r"/>
+            <a:r>
+              <a:rPr lang="en-CA" sz="4500">
+                <a:solidFill>
+                  <a:schemeClr val="bg1"/>
+                </a:solidFill>
+              </a:rPr>
+              <a:t>Types of Authentication	</a:t>
+            </a:r>
+          </a:p>
+        </p:txBody>
+      </p:sp>
+      <p:sp>
+        <p:nvSpPr>
+          <p:cNvPr id="11" name="Graphic 12">
+            <a:extLst>
+              <a:ext uri="{FF2B5EF4-FFF2-40B4-BE49-F238E27FC236}">
+                <a16:creationId xmlns:a16="http://schemas.microsoft.com/office/drawing/2014/main" id="{58BDB0EE-D238-415B-9ED8-62AA6AB2AAD1}"/>
+              </a:ext>
+              <a:ext uri="{C183D7F6-B498-43B3-948B-1728B52AA6E4}">
+                <adec:decorative xmlns:adec="http://schemas.microsoft.com/office/drawing/2017/decorative" val="1"/>
+              </a:ext>
+            </a:extLst>
+          </p:cNvPr>
+          <p:cNvSpPr>
+            <a:spLocks noGrp="1" noRot="1" noChangeAspect="1" noMove="1" noResize="1" noEditPoints="1" noAdjustHandles="1" noChangeArrowheads="1" noChangeShapeType="1" noTextEdit="1"/>
+          </p:cNvSpPr>
+          <p:nvPr>
+            <p:extLst>
+              <p:ext uri="{386F3935-93C4-4BCD-93E2-E3B085C9AB24}">
+                <p16:designElem xmlns:p16="http://schemas.microsoft.com/office/powerpoint/2015/main" val="1"/>
+              </p:ext>
+            </p:extLst>
+          </p:nvPr>
+        </p:nvSpPr>
+        <p:spPr>
+          <a:xfrm>
+            <a:off x="11433111" y="696037"/>
+            <a:ext cx="139039" cy="139039"/>
+          </a:xfrm>
+          <a:custGeom>
+            <a:avLst/>
+            <a:gdLst>
+              <a:gd name="connsiteX0" fmla="*/ 129602 w 139039"/>
+              <a:gd name="connsiteY0" fmla="*/ 60082 h 139039"/>
+              <a:gd name="connsiteX1" fmla="*/ 78957 w 139039"/>
+              <a:gd name="connsiteY1" fmla="*/ 60082 h 139039"/>
+              <a:gd name="connsiteX2" fmla="*/ 78957 w 139039"/>
+              <a:gd name="connsiteY2" fmla="*/ 9437 h 139039"/>
+              <a:gd name="connsiteX3" fmla="*/ 69520 w 139039"/>
+              <a:gd name="connsiteY3" fmla="*/ 0 h 139039"/>
+              <a:gd name="connsiteX4" fmla="*/ 60082 w 139039"/>
+              <a:gd name="connsiteY4" fmla="*/ 9437 h 139039"/>
+              <a:gd name="connsiteX5" fmla="*/ 60082 w 139039"/>
+              <a:gd name="connsiteY5" fmla="*/ 60082 h 139039"/>
+              <a:gd name="connsiteX6" fmla="*/ 9437 w 139039"/>
+              <a:gd name="connsiteY6" fmla="*/ 60082 h 139039"/>
+              <a:gd name="connsiteX7" fmla="*/ 0 w 139039"/>
+              <a:gd name="connsiteY7" fmla="*/ 69520 h 139039"/>
+              <a:gd name="connsiteX8" fmla="*/ 9437 w 139039"/>
+              <a:gd name="connsiteY8" fmla="*/ 78957 h 139039"/>
+              <a:gd name="connsiteX9" fmla="*/ 60082 w 139039"/>
+              <a:gd name="connsiteY9" fmla="*/ 78957 h 139039"/>
+              <a:gd name="connsiteX10" fmla="*/ 60082 w 139039"/>
+              <a:gd name="connsiteY10" fmla="*/ 129602 h 139039"/>
+              <a:gd name="connsiteX11" fmla="*/ 69520 w 139039"/>
+              <a:gd name="connsiteY11" fmla="*/ 139039 h 139039"/>
+              <a:gd name="connsiteX12" fmla="*/ 78957 w 139039"/>
+              <a:gd name="connsiteY12" fmla="*/ 129602 h 139039"/>
+              <a:gd name="connsiteX13" fmla="*/ 78957 w 139039"/>
+              <a:gd name="connsiteY13" fmla="*/ 78957 h 139039"/>
+              <a:gd name="connsiteX14" fmla="*/ 129602 w 139039"/>
+              <a:gd name="connsiteY14" fmla="*/ 78957 h 139039"/>
+              <a:gd name="connsiteX15" fmla="*/ 139039 w 139039"/>
+              <a:gd name="connsiteY15" fmla="*/ 69520 h 139039"/>
+              <a:gd name="connsiteX16" fmla="*/ 129602 w 139039"/>
+              <a:gd name="connsiteY16" fmla="*/ 60082 h 139039"/>
+            </a:gdLst>
+            <a:ahLst/>
+            <a:cxnLst>
+              <a:cxn ang="0">
+                <a:pos x="connsiteX0" y="connsiteY0"/>
+              </a:cxn>
+              <a:cxn ang="0">
+                <a:pos x="connsiteX1" y="connsiteY1"/>
+              </a:cxn>
+              <a:cxn ang="0">
+                <a:pos x="connsiteX2" y="connsiteY2"/>
+              </a:cxn>
+              <a:cxn ang="0">
+                <a:pos x="connsiteX3" y="connsiteY3"/>
+              </a:cxn>
+              <a:cxn ang="0">
+                <a:pos x="connsiteX4" y="connsiteY4"/>
+              </a:cxn>
+              <a:cxn ang="0">
+                <a:pos x="connsiteX5" y="connsiteY5"/>
+              </a:cxn>
+              <a:cxn ang="0">
+                <a:pos x="connsiteX6" y="connsiteY6"/>
+              </a:cxn>
+              <a:cxn ang="0">
+                <a:pos x="connsiteX7" y="connsiteY7"/>
+              </a:cxn>
+              <a:cxn ang="0">
+                <a:pos x="connsiteX8" y="connsiteY8"/>
+              </a:cxn>
+              <a:cxn ang="0">
+                <a:pos x="connsiteX9" y="connsiteY9"/>
+              </a:cxn>
+              <a:cxn ang="0">
+                <a:pos x="connsiteX10" y="connsiteY10"/>
+              </a:cxn>
+              <a:cxn ang="0">
+                <a:pos x="connsiteX11" y="connsiteY11"/>
+              </a:cxn>
+              <a:cxn ang="0">
+                <a:pos x="connsiteX12" y="connsiteY12"/>
+              </a:cxn>
+              <a:cxn ang="0">
+                <a:pos x="connsiteX13" y="connsiteY13"/>
+              </a:cxn>
+              <a:cxn ang="0">
+                <a:pos x="connsiteX14" y="connsiteY14"/>
+              </a:cxn>
+              <a:cxn ang="0">
+                <a:pos x="connsiteX15" y="connsiteY15"/>
+              </a:cxn>
+              <a:cxn ang="0">
+                <a:pos x="connsiteX16" y="connsiteY16"/>
+              </a:cxn>
+            </a:cxnLst>
+            <a:rect l="l" t="t" r="r" b="b"/>
+            <a:pathLst>
+              <a:path w="139039" h="139039">
+                <a:moveTo>
+                  <a:pt x="129602" y="60082"/>
+                </a:moveTo>
+                <a:lnTo>
+                  <a:pt x="78957" y="60082"/>
+                </a:lnTo>
+                <a:lnTo>
+                  <a:pt x="78957" y="9437"/>
+                </a:lnTo>
+                <a:cubicBezTo>
+                  <a:pt x="78957" y="4225"/>
+                  <a:pt x="74731" y="0"/>
+                  <a:pt x="69520" y="0"/>
+                </a:cubicBezTo>
+                <a:cubicBezTo>
+                  <a:pt x="64308" y="0"/>
+                  <a:pt x="60082" y="4225"/>
+                  <a:pt x="60082" y="9437"/>
+                </a:cubicBezTo>
+                <a:lnTo>
+                  <a:pt x="60082" y="60082"/>
+                </a:lnTo>
+                <a:lnTo>
+                  <a:pt x="9437" y="60082"/>
+                </a:lnTo>
+                <a:cubicBezTo>
+                  <a:pt x="4225" y="60082"/>
+                  <a:pt x="0" y="64308"/>
+                  <a:pt x="0" y="69520"/>
+                </a:cubicBezTo>
+                <a:cubicBezTo>
+                  <a:pt x="0" y="74731"/>
+                  <a:pt x="4225" y="78957"/>
+                  <a:pt x="9437" y="78957"/>
+                </a:cubicBezTo>
+                <a:lnTo>
+                  <a:pt x="60082" y="78957"/>
+                </a:lnTo>
+                <a:lnTo>
+                  <a:pt x="60082" y="129602"/>
+                </a:lnTo>
+                <a:cubicBezTo>
+                  <a:pt x="60082" y="134814"/>
+                  <a:pt x="64308" y="139039"/>
+                  <a:pt x="69520" y="139039"/>
+                </a:cubicBezTo>
+                <a:cubicBezTo>
+                  <a:pt x="74731" y="139039"/>
+                  <a:pt x="78957" y="134814"/>
+                  <a:pt x="78957" y="129602"/>
+                </a:cubicBezTo>
+                <a:lnTo>
+                  <a:pt x="78957" y="78957"/>
+                </a:lnTo>
+                <a:lnTo>
+                  <a:pt x="129602" y="78957"/>
+                </a:lnTo>
+                <a:cubicBezTo>
+                  <a:pt x="134814" y="78957"/>
+                  <a:pt x="139039" y="74731"/>
+                  <a:pt x="139039" y="69520"/>
+                </a:cubicBezTo>
+                <a:cubicBezTo>
+                  <a:pt x="139039" y="64308"/>
+                  <a:pt x="134814" y="60082"/>
+                  <a:pt x="129602" y="60082"/>
+                </a:cubicBezTo>
+                <a:close/>
+              </a:path>
+            </a:pathLst>
+          </a:custGeom>
+          <a:solidFill>
+            <a:schemeClr val="bg1"/>
+          </a:solidFill>
+          <a:ln w="603" cap="flat">
+            <a:noFill/>
+            <a:prstDash val="solid"/>
+            <a:miter/>
+          </a:ln>
+        </p:spPr>
+        <p:txBody>
+          <a:bodyPr rtlCol="0" anchor="ctr"/>
+          <a:lstStyle/>
+          <a:p>
+            <a:endParaRPr lang="en-US"/>
+          </a:p>
+        </p:txBody>
+      </p:sp>
+      <p:sp>
+        <p:nvSpPr>
+          <p:cNvPr id="13" name="Graphic 11">
+            <a:extLst>
+              <a:ext uri="{FF2B5EF4-FFF2-40B4-BE49-F238E27FC236}">
+                <a16:creationId xmlns:a16="http://schemas.microsoft.com/office/drawing/2014/main" id="{C5B55FC3-961D-4325-82F1-DE92B0D04E03}"/>
+              </a:ext>
+              <a:ext uri="{C183D7F6-B498-43B3-948B-1728B52AA6E4}">
+                <adec:decorative xmlns:adec="http://schemas.microsoft.com/office/drawing/2017/decorative" val="1"/>
+              </a:ext>
+            </a:extLst>
+          </p:cNvPr>
+          <p:cNvSpPr>
+            <a:spLocks noGrp="1" noRot="1" noChangeAspect="1" noMove="1" noResize="1" noEditPoints="1" noAdjustHandles="1" noChangeArrowheads="1" noChangeShapeType="1" noTextEdit="1"/>
+          </p:cNvSpPr>
+          <p:nvPr>
+            <p:extLst>
+              <p:ext uri="{386F3935-93C4-4BCD-93E2-E3B085C9AB24}">
+                <p16:designElem xmlns:p16="http://schemas.microsoft.com/office/powerpoint/2015/main" val="1"/>
+              </p:ext>
+            </p:extLst>
+          </p:nvPr>
+        </p:nvSpPr>
+        <p:spPr>
+          <a:xfrm>
+            <a:off x="11791891" y="925332"/>
+            <a:ext cx="91138" cy="91138"/>
+          </a:xfrm>
+          <a:custGeom>
+            <a:avLst/>
+            <a:gdLst>
+              <a:gd name="connsiteX0" fmla="*/ 91138 w 91138"/>
+              <a:gd name="connsiteY0" fmla="*/ 45569 h 91138"/>
+              <a:gd name="connsiteX1" fmla="*/ 45569 w 91138"/>
+              <a:gd name="connsiteY1" fmla="*/ 91138 h 91138"/>
+              <a:gd name="connsiteX2" fmla="*/ 0 w 91138"/>
+              <a:gd name="connsiteY2" fmla="*/ 45569 h 91138"/>
+              <a:gd name="connsiteX3" fmla="*/ 45569 w 91138"/>
+              <a:gd name="connsiteY3" fmla="*/ 0 h 91138"/>
+              <a:gd name="connsiteX4" fmla="*/ 91138 w 91138"/>
+              <a:gd name="connsiteY4" fmla="*/ 45569 h 91138"/>
+            </a:gdLst>
+            <a:ahLst/>
+            <a:cxnLst>
+              <a:cxn ang="0">
+                <a:pos x="connsiteX0" y="connsiteY0"/>
+              </a:cxn>
+              <a:cxn ang="0">
+                <a:pos x="connsiteX1" y="connsiteY1"/>
+              </a:cxn>
+              <a:cxn ang="0">
+                <a:pos x="connsiteX2" y="connsiteY2"/>
+              </a:cxn>
+              <a:cxn ang="0">
+                <a:pos x="connsiteX3" y="connsiteY3"/>
+              </a:cxn>
+              <a:cxn ang="0">
+                <a:pos x="connsiteX4" y="connsiteY4"/>
+              </a:cxn>
+            </a:cxnLst>
+            <a:rect l="l" t="t" r="r" b="b"/>
+            <a:pathLst>
+              <a:path w="91138" h="91138">
+                <a:moveTo>
+                  <a:pt x="91138" y="45569"/>
+                </a:moveTo>
+                <a:cubicBezTo>
+                  <a:pt x="91138" y="70736"/>
+                  <a:pt x="70736" y="91138"/>
+                  <a:pt x="45569" y="91138"/>
+                </a:cubicBezTo>
+                <a:cubicBezTo>
+                  <a:pt x="20402" y="91138"/>
+                  <a:pt x="0" y="70736"/>
+                  <a:pt x="0" y="45569"/>
+                </a:cubicBezTo>
+                <a:cubicBezTo>
+                  <a:pt x="0" y="20402"/>
+                  <a:pt x="20402" y="0"/>
+                  <a:pt x="45569" y="0"/>
+                </a:cubicBezTo>
+                <a:cubicBezTo>
+                  <a:pt x="70736" y="0"/>
+                  <a:pt x="91138" y="20402"/>
+                  <a:pt x="91138" y="45569"/>
+                </a:cubicBezTo>
+                <a:close/>
+              </a:path>
+            </a:pathLst>
+          </a:custGeom>
+          <a:solidFill>
+            <a:schemeClr val="bg1"/>
+          </a:solidFill>
+          <a:ln w="422" cap="flat">
+            <a:noFill/>
+            <a:prstDash val="solid"/>
+            <a:miter/>
+          </a:ln>
+        </p:spPr>
+        <p:txBody>
+          <a:bodyPr rtlCol="0" anchor="ctr"/>
+          <a:lstStyle/>
+          <a:p>
+            <a:endParaRPr lang="en-US"/>
+          </a:p>
+        </p:txBody>
+      </p:sp>
+      <p:cxnSp>
+        <p:nvCxnSpPr>
+          <p:cNvPr id="15" name="Straight Connector 14">
+            <a:extLst>
+              <a:ext uri="{FF2B5EF4-FFF2-40B4-BE49-F238E27FC236}">
+                <a16:creationId xmlns:a16="http://schemas.microsoft.com/office/drawing/2014/main" id="{C8F51B3F-8331-4E4A-AE96-D47B1006EEAD}"/>
+              </a:ext>
+              <a:ext uri="{C183D7F6-B498-43B3-948B-1728B52AA6E4}">
+                <adec:decorative xmlns:adec="http://schemas.microsoft.com/office/drawing/2017/decorative" val="1"/>
+              </a:ext>
+            </a:extLst>
+          </p:cNvPr>
+          <p:cNvCxnSpPr>
+            <a:cxnSpLocks noGrp="1" noRot="1" noChangeAspect="1" noMove="1" noResize="1" noEditPoints="1" noAdjustHandles="1" noChangeArrowheads="1" noChangeShapeType="1"/>
+          </p:cNvCxnSpPr>
+          <p:nvPr>
+            <p:extLst>
+              <p:ext uri="{386F3935-93C4-4BCD-93E2-E3B085C9AB24}">
+                <p16:designElem xmlns:p16="http://schemas.microsoft.com/office/powerpoint/2015/main" val="1"/>
+              </p:ext>
+            </p:extLst>
+          </p:nvPr>
+        </p:nvCxnSpPr>
+        <p:spPr>
+          <a:xfrm>
+            <a:off x="4728053" y="1132114"/>
+            <a:ext cx="0" cy="5717573"/>
+          </a:xfrm>
+          <a:prstGeom prst="line">
+            <a:avLst/>
+          </a:prstGeom>
+          <a:ln w="25400" cap="sq">
+            <a:solidFill>
+              <a:schemeClr val="lt1">
+                <a:hueOff val="0"/>
+                <a:satOff val="0"/>
+                <a:lumOff val="0"/>
+              </a:schemeClr>
+            </a:solidFill>
+            <a:bevel/>
+          </a:ln>
+        </p:spPr>
+        <p:style>
+          <a:lnRef idx="1">
+            <a:schemeClr val="accent1"/>
+          </a:lnRef>
+          <a:fillRef idx="0">
+            <a:schemeClr val="accent1"/>
+          </a:fillRef>
+          <a:effectRef idx="0">
+            <a:schemeClr val="accent1"/>
+          </a:effectRef>
+          <a:fontRef idx="minor">
+            <a:schemeClr val="tx1"/>
+          </a:fontRef>
+        </p:style>
+      </p:cxnSp>
+      <p:sp>
+        <p:nvSpPr>
+          <p:cNvPr id="17" name="Graphic 13">
+            <a:extLst>
+              <a:ext uri="{FF2B5EF4-FFF2-40B4-BE49-F238E27FC236}">
+                <a16:creationId xmlns:a16="http://schemas.microsoft.com/office/drawing/2014/main" id="{4C8AB332-D09E-4F28-943C-DABDD4716A3C}"/>
+              </a:ext>
+              <a:ext uri="{C183D7F6-B498-43B3-948B-1728B52AA6E4}">
+                <adec:decorative xmlns:adec="http://schemas.microsoft.com/office/drawing/2017/decorative" val="1"/>
+              </a:ext>
+            </a:extLst>
+          </p:cNvPr>
+          <p:cNvSpPr>
+            <a:spLocks noGrp="1" noRot="1" noChangeAspect="1" noMove="1" noResize="1" noEditPoints="1" noAdjustHandles="1" noChangeArrowheads="1" noChangeShapeType="1" noTextEdit="1"/>
+          </p:cNvSpPr>
+          <p:nvPr>
+            <p:extLst>
+              <p:ext uri="{386F3935-93C4-4BCD-93E2-E3B085C9AB24}">
+                <p16:designElem xmlns:p16="http://schemas.microsoft.com/office/powerpoint/2015/main" val="1"/>
+              </p:ext>
+            </p:extLst>
+          </p:nvPr>
+        </p:nvSpPr>
+        <p:spPr>
+          <a:xfrm>
+            <a:off x="11417571" y="1440476"/>
+            <a:ext cx="127714" cy="127714"/>
+          </a:xfrm>
+          <a:custGeom>
+            <a:avLst/>
+            <a:gdLst>
+              <a:gd name="connsiteX0" fmla="*/ 63857 w 127714"/>
+              <a:gd name="connsiteY0" fmla="*/ 18874 h 127714"/>
+              <a:gd name="connsiteX1" fmla="*/ 108840 w 127714"/>
+              <a:gd name="connsiteY1" fmla="*/ 63857 h 127714"/>
+              <a:gd name="connsiteX2" fmla="*/ 63857 w 127714"/>
+              <a:gd name="connsiteY2" fmla="*/ 108840 h 127714"/>
+              <a:gd name="connsiteX3" fmla="*/ 18874 w 127714"/>
+              <a:gd name="connsiteY3" fmla="*/ 63857 h 127714"/>
+              <a:gd name="connsiteX4" fmla="*/ 63857 w 127714"/>
+              <a:gd name="connsiteY4" fmla="*/ 18874 h 127714"/>
+              <a:gd name="connsiteX5" fmla="*/ 63857 w 127714"/>
+              <a:gd name="connsiteY5" fmla="*/ 0 h 127714"/>
+              <a:gd name="connsiteX6" fmla="*/ 0 w 127714"/>
+              <a:gd name="connsiteY6" fmla="*/ 63857 h 127714"/>
+              <a:gd name="connsiteX7" fmla="*/ 63857 w 127714"/>
+              <a:gd name="connsiteY7" fmla="*/ 127714 h 127714"/>
+              <a:gd name="connsiteX8" fmla="*/ 127714 w 127714"/>
+              <a:gd name="connsiteY8" fmla="*/ 63857 h 127714"/>
+              <a:gd name="connsiteX9" fmla="*/ 63857 w 127714"/>
+              <a:gd name="connsiteY9" fmla="*/ 0 h 127714"/>
+            </a:gdLst>
+            <a:ahLst/>
+            <a:cxnLst>
+              <a:cxn ang="0">
+                <a:pos x="connsiteX0" y="connsiteY0"/>
+              </a:cxn>
+              <a:cxn ang="0">
+                <a:pos x="connsiteX1" y="connsiteY1"/>
+              </a:cxn>
+              <a:cxn ang="0">
+                <a:pos x="connsiteX2" y="connsiteY2"/>
+              </a:cxn>
+              <a:cxn ang="0">
+                <a:pos x="connsiteX3" y="connsiteY3"/>
+              </a:cxn>
+              <a:cxn ang="0">
+                <a:pos x="connsiteX4" y="connsiteY4"/>
+              </a:cxn>
+              <a:cxn ang="0">
+                <a:pos x="connsiteX5" y="connsiteY5"/>
+              </a:cxn>
+              <a:cxn ang="0">
+                <a:pos x="connsiteX6" y="connsiteY6"/>
+              </a:cxn>
+              <a:cxn ang="0">
+                <a:pos x="connsiteX7" y="connsiteY7"/>
+              </a:cxn>
+              <a:cxn ang="0">
+                <a:pos x="connsiteX8" y="connsiteY8"/>
+              </a:cxn>
+              <a:cxn ang="0">
+                <a:pos x="connsiteX9" y="connsiteY9"/>
+              </a:cxn>
+            </a:cxnLst>
+            <a:rect l="l" t="t" r="r" b="b"/>
+            <a:pathLst>
+              <a:path w="127714" h="127714">
+                <a:moveTo>
+                  <a:pt x="63857" y="18874"/>
+                </a:moveTo>
+                <a:cubicBezTo>
+                  <a:pt x="88700" y="18874"/>
+                  <a:pt x="108840" y="39014"/>
+                  <a:pt x="108840" y="63857"/>
+                </a:cubicBezTo>
+                <a:cubicBezTo>
+                  <a:pt x="108840" y="88700"/>
+                  <a:pt x="88700" y="108840"/>
+                  <a:pt x="63857" y="108840"/>
+                </a:cubicBezTo>
+                <a:cubicBezTo>
+                  <a:pt x="39014" y="108840"/>
+                  <a:pt x="18874" y="88700"/>
+                  <a:pt x="18874" y="63857"/>
+                </a:cubicBezTo>
+                <a:cubicBezTo>
+                  <a:pt x="18898" y="39024"/>
+                  <a:pt x="39024" y="18898"/>
+                  <a:pt x="63857" y="18874"/>
+                </a:cubicBezTo>
+                <a:moveTo>
+                  <a:pt x="63857" y="0"/>
+                </a:moveTo>
+                <a:cubicBezTo>
+                  <a:pt x="28590" y="0"/>
+                  <a:pt x="0" y="28590"/>
+                  <a:pt x="0" y="63857"/>
+                </a:cubicBezTo>
+                <a:cubicBezTo>
+                  <a:pt x="0" y="99124"/>
+                  <a:pt x="28590" y="127714"/>
+                  <a:pt x="63857" y="127714"/>
+                </a:cubicBezTo>
+                <a:cubicBezTo>
+                  <a:pt x="99124" y="127714"/>
+                  <a:pt x="127714" y="99124"/>
+                  <a:pt x="127714" y="63857"/>
+                </a:cubicBezTo>
+                <a:cubicBezTo>
+                  <a:pt x="127714" y="28590"/>
+                  <a:pt x="99124" y="0"/>
+                  <a:pt x="63857" y="0"/>
+                </a:cubicBezTo>
+                <a:close/>
+              </a:path>
+            </a:pathLst>
+          </a:custGeom>
+          <a:solidFill>
+            <a:schemeClr val="bg1"/>
+          </a:solidFill>
+          <a:ln w="610" cap="flat">
+            <a:noFill/>
+            <a:prstDash val="solid"/>
+            <a:miter/>
+          </a:ln>
+        </p:spPr>
+        <p:txBody>
+          <a:bodyPr rtlCol="0" anchor="ctr"/>
+          <a:lstStyle/>
+          <a:p>
+            <a:endParaRPr lang="en-US"/>
+          </a:p>
+        </p:txBody>
+      </p:sp>
+      <p:graphicFrame>
+        <p:nvGraphicFramePr>
+          <p:cNvPr id="5" name="Content Placeholder 2">
+            <a:extLst>
+              <a:ext uri="{FF2B5EF4-FFF2-40B4-BE49-F238E27FC236}">
+                <a16:creationId xmlns:a16="http://schemas.microsoft.com/office/drawing/2014/main" id="{39D2A6C8-5C3B-4BE3-A49D-E937E053B594}"/>
+              </a:ext>
+            </a:extLst>
+          </p:cNvPr>
+          <p:cNvGraphicFramePr>
+            <a:graphicFrameLocks noGrp="1"/>
+          </p:cNvGraphicFramePr>
+          <p:nvPr>
+            <p:ph idx="1"/>
+            <p:extLst>
+              <p:ext uri="{D42A27DB-BD31-4B8C-83A1-F6EECF244321}">
+                <p14:modId xmlns:p14="http://schemas.microsoft.com/office/powerpoint/2010/main" val="1767666625"/>
+              </p:ext>
+            </p:extLst>
+          </p:nvPr>
+        </p:nvGraphicFramePr>
+        <p:xfrm>
+          <a:off x="5108535" y="1070800"/>
+          <a:ext cx="6245265" cy="5589347"/>
+        </p:xfrm>
+        <a:graphic>
+          <a:graphicData uri="http://schemas.openxmlformats.org/drawingml/2006/diagram">
+            <dgm:relIds xmlns:dgm="http://schemas.openxmlformats.org/drawingml/2006/diagram" xmlns:r="http://schemas.openxmlformats.org/officeDocument/2006/relationships" r:dm="rId2" r:lo="rId3" r:qs="rId4" r:cs="rId5"/>
+          </a:graphicData>
+        </a:graphic>
+      </p:graphicFrame>
+    </p:spTree>
+    <p:extLst>
+      <p:ext uri="{BB962C8B-B14F-4D97-AF65-F5344CB8AC3E}">
+        <p14:creationId xmlns:p14="http://schemas.microsoft.com/office/powerpoint/2010/main" val="877729507"/>
+      </p:ext>
+    </p:extLst>
+  </p:cSld>
+  <p:clrMapOvr>
+    <a:masterClrMapping/>
+  </p:clrMapOvr>
+</p:sld>
+</file>
+
+<file path=ppt/slides/slide6.xml><?xml version="1.0" encoding="utf-8"?>
+<p:sld xmlns:a="http://schemas.openxmlformats.org/drawingml/2006/main" xmlns:r="http://schemas.openxmlformats.org/officeDocument/2006/relationships" xmlns:p="http://schemas.openxmlformats.org/presentationml/2006/main">
+  <p:cSld>
+    <p:bg>
+      <p:bgPr>
+        <a:solidFill>
+          <a:schemeClr val="bg1"/>
+        </a:solidFill>
+        <a:effectLst/>
+      </p:bgPr>
+    </p:bg>
+    <p:spTree>
+      <p:nvGrpSpPr>
+        <p:cNvPr id="1" name=""/>
+        <p:cNvGrpSpPr/>
+        <p:nvPr/>
+      </p:nvGrpSpPr>
+      <p:grpSpPr>
+        <a:xfrm>
+          <a:off x="0" y="0"/>
+          <a:ext cx="0" cy="0"/>
+          <a:chOff x="0" y="0"/>
+          <a:chExt cx="0" cy="0"/>
+        </a:xfrm>
+      </p:grpSpPr>
+      <p:sp useBgFill="1">
+        <p:nvSpPr>
+          <p:cNvPr id="13" name="Rectangle 12">
+            <a:extLst>
+              <a:ext uri="{FF2B5EF4-FFF2-40B4-BE49-F238E27FC236}">
+                <a16:creationId xmlns:a16="http://schemas.microsoft.com/office/drawing/2014/main" id="{A2679492-7988-4050-9056-542444452411}"/>
+              </a:ext>
+              <a:ext uri="{C183D7F6-B498-43B3-948B-1728B52AA6E4}">
+                <adec:decorative xmlns:adec="http://schemas.microsoft.com/office/drawing/2017/decorative" val="1"/>
+              </a:ext>
+            </a:extLst>
+          </p:cNvPr>
+          <p:cNvSpPr>
+            <a:spLocks noGrp="1" noRot="1" noChangeAspect="1" noMove="1" noResize="1" noEditPoints="1" noAdjustHandles="1" noChangeArrowheads="1" noChangeShapeType="1" noTextEdit="1"/>
+          </p:cNvSpPr>
+          <p:nvPr>
+            <p:extLst>
+              <p:ext uri="{386F3935-93C4-4BCD-93E2-E3B085C9AB24}">
+                <p16:designElem xmlns:p16="http://schemas.microsoft.com/office/powerpoint/2015/main" val="1"/>
+              </p:ext>
+            </p:extLst>
+          </p:nvPr>
+        </p:nvSpPr>
+        <p:spPr>
+          <a:xfrm>
+            <a:off x="0" y="0"/>
+            <a:ext cx="12192000" cy="6858000"/>
+          </a:xfrm>
+          <a:prstGeom prst="rect">
+            <a:avLst/>
+          </a:prstGeom>
+          <a:ln>
+            <a:noFill/>
+          </a:ln>
+        </p:spPr>
+        <p:style>
+          <a:lnRef idx="2">
+            <a:schemeClr val="accent1">
+              <a:shade val="50000"/>
+            </a:schemeClr>
+          </a:lnRef>
+          <a:fillRef idx="1">
+            <a:schemeClr val="accent1"/>
+          </a:fillRef>
+          <a:effectRef idx="0">
+            <a:schemeClr val="accent1"/>
+          </a:effectRef>
+          <a:fontRef idx="minor">
+            <a:schemeClr val="lt1"/>
+          </a:fontRef>
+        </p:style>
+        <p:txBody>
+          <a:bodyPr rtlCol="0" anchor="ctr"/>
+          <a:lstStyle/>
+          <a:p>
+            <a:pPr algn="ctr"/>
+            <a:endParaRPr lang="en-US"/>
+          </a:p>
+        </p:txBody>
+      </p:sp>
+      <p:sp>
+        <p:nvSpPr>
+          <p:cNvPr id="2" name="Title 1">
+            <a:extLst>
+              <a:ext uri="{FF2B5EF4-FFF2-40B4-BE49-F238E27FC236}">
+                <a16:creationId xmlns:a16="http://schemas.microsoft.com/office/drawing/2014/main" id="{7D4060C9-2A2B-4D51-806F-90EDEDFD97F0}"/>
+              </a:ext>
+            </a:extLst>
+          </p:cNvPr>
+          <p:cNvSpPr>
+            <a:spLocks noGrp="1"/>
+          </p:cNvSpPr>
+          <p:nvPr>
+            <p:ph type="title"/>
+          </p:nvPr>
+        </p:nvSpPr>
+        <p:spPr>
+          <a:xfrm>
+            <a:off x="6412091" y="501651"/>
+            <a:ext cx="4395340" cy="1716255"/>
+          </a:xfrm>
+        </p:spPr>
+        <p:txBody>
+          <a:bodyPr anchor="b">
+            <a:normAutofit/>
+          </a:bodyPr>
+          <a:lstStyle/>
+          <a:p>
+            <a:r>
+              <a:rPr lang="en-CA" sz="4600"/>
+              <a:t>Role Base Authentication	</a:t>
+            </a:r>
+          </a:p>
+        </p:txBody>
+      </p:sp>
+      <p:sp>
+        <p:nvSpPr>
+          <p:cNvPr id="15" name="Rectangle 14">
+            <a:extLst>
+              <a:ext uri="{FF2B5EF4-FFF2-40B4-BE49-F238E27FC236}">
+                <a16:creationId xmlns:a16="http://schemas.microsoft.com/office/drawing/2014/main" id="{B091B163-7D61-4891-ABCF-5C13D9C418D0}"/>
+              </a:ext>
+              <a:ext uri="{C183D7F6-B498-43B3-948B-1728B52AA6E4}">
+                <adec:decorative xmlns:adec="http://schemas.microsoft.com/office/drawing/2017/decorative" val="1"/>
+              </a:ext>
+            </a:extLst>
+          </p:cNvPr>
+          <p:cNvSpPr>
+            <a:spLocks noGrp="1" noRot="1" noChangeAspect="1" noMove="1" noResize="1" noEditPoints="1" noAdjustHandles="1" noChangeArrowheads="1" noChangeShapeType="1" noTextEdit="1"/>
+          </p:cNvSpPr>
+          <p:nvPr>
+            <p:extLst>
+              <p:ext uri="{386F3935-93C4-4BCD-93E2-E3B085C9AB24}">
+                <p16:designElem xmlns:p16="http://schemas.microsoft.com/office/powerpoint/2015/main" val="1"/>
+              </p:ext>
+            </p:extLst>
+          </p:nvPr>
+        </p:nvSpPr>
+        <p:spPr>
+          <a:xfrm>
+            <a:off x="0" y="0"/>
+            <a:ext cx="5779911" cy="6858000"/>
+          </a:xfrm>
+          <a:prstGeom prst="rect">
+            <a:avLst/>
+          </a:prstGeom>
+          <a:gradFill flip="none" rotWithShape="1">
+            <a:gsLst>
+              <a:gs pos="100000">
+                <a:schemeClr val="accent4"/>
+              </a:gs>
+              <a:gs pos="0">
+                <a:schemeClr val="accent2"/>
+              </a:gs>
+            </a:gsLst>
+            <a:lin ang="2700000" scaled="1"/>
+            <a:tileRect/>
+          </a:gradFill>
+          <a:ln>
+            <a:noFill/>
+          </a:ln>
+        </p:spPr>
+        <p:style>
+          <a:lnRef idx="2">
+            <a:schemeClr val="accent1">
+              <a:shade val="50000"/>
+            </a:schemeClr>
+          </a:lnRef>
+          <a:fillRef idx="1">
+            <a:schemeClr val="accent1"/>
+          </a:fillRef>
+          <a:effectRef idx="0">
+            <a:schemeClr val="accent1"/>
+          </a:effectRef>
+          <a:fontRef idx="minor">
+            <a:schemeClr val="lt1"/>
+          </a:fontRef>
+        </p:style>
+        <p:txBody>
+          <a:bodyPr rtlCol="0" anchor="ctr"/>
+          <a:lstStyle/>
+          <a:p>
+            <a:pPr algn="ctr"/>
+            <a:endParaRPr lang="en-US"/>
+          </a:p>
+        </p:txBody>
+      </p:sp>
+      <p:pic>
+        <p:nvPicPr>
+          <p:cNvPr id="6" name="Content Placeholder 5" descr="Text&#10;&#10;Description automatically generated">
+            <a:extLst>
+              <a:ext uri="{FF2B5EF4-FFF2-40B4-BE49-F238E27FC236}">
+                <a16:creationId xmlns:a16="http://schemas.microsoft.com/office/drawing/2014/main" id="{2C441B92-53D3-4AFC-98F3-B598EE36DCEF}"/>
+              </a:ext>
+            </a:extLst>
+          </p:cNvPr>
+          <p:cNvPicPr>
+            <a:picLocks noChangeAspect="1"/>
+          </p:cNvPicPr>
+          <p:nvPr/>
+        </p:nvPicPr>
+        <p:blipFill>
+          <a:blip r:embed="rId2">
+            <a:extLst>
+              <a:ext uri="{28A0092B-C50C-407E-A947-70E740481C1C}">
+                <a14:useLocalDpi xmlns:a14="http://schemas.microsoft.com/office/drawing/2010/main" val="0"/>
+              </a:ext>
+            </a:extLst>
+          </a:blip>
+          <a:stretch>
+            <a:fillRect/>
+          </a:stretch>
+        </p:blipFill>
+        <p:spPr>
+          <a:xfrm>
+            <a:off x="279143" y="2110540"/>
+            <a:ext cx="5221625" cy="2636921"/>
+          </a:xfrm>
+          <a:prstGeom prst="rect">
+            <a:avLst/>
+          </a:prstGeom>
+        </p:spPr>
+      </p:pic>
+      <p:sp>
+        <p:nvSpPr>
+          <p:cNvPr id="10" name="Content Placeholder 9">
+            <a:extLst>
+              <a:ext uri="{FF2B5EF4-FFF2-40B4-BE49-F238E27FC236}">
+                <a16:creationId xmlns:a16="http://schemas.microsoft.com/office/drawing/2014/main" id="{B0FF6D25-2514-4E72-B5F4-4D53641BDE6E}"/>
+              </a:ext>
+            </a:extLst>
+          </p:cNvPr>
+          <p:cNvSpPr>
+            <a:spLocks noGrp="1"/>
+          </p:cNvSpPr>
+          <p:nvPr>
+            <p:ph idx="1"/>
+          </p:nvPr>
+        </p:nvSpPr>
+        <p:spPr>
+          <a:xfrm>
+            <a:off x="6392583" y="2645922"/>
+            <a:ext cx="4434721" cy="3710427"/>
+          </a:xfrm>
+        </p:spPr>
+        <p:txBody>
+          <a:bodyPr anchor="t">
+            <a:normAutofit/>
+          </a:bodyPr>
+          <a:lstStyle/>
+          <a:p>
+            <a:endParaRPr lang="en-US" sz="1800"/>
+          </a:p>
+        </p:txBody>
+      </p:sp>
+      <p:cxnSp>
+        <p:nvCxnSpPr>
+          <p:cNvPr id="17" name="Straight Connector 16">
+            <a:extLst>
+              <a:ext uri="{FF2B5EF4-FFF2-40B4-BE49-F238E27FC236}">
+                <a16:creationId xmlns:a16="http://schemas.microsoft.com/office/drawing/2014/main" id="{C49DA8F6-BCC1-4447-B54C-57856834B94B}"/>
+              </a:ext>
+              <a:ext uri="{C183D7F6-B498-43B3-948B-1728B52AA6E4}">
+                <adec:decorative xmlns:adec="http://schemas.microsoft.com/office/drawing/2017/decorative" val="1"/>
+              </a:ext>
+            </a:extLst>
+          </p:cNvPr>
+          <p:cNvCxnSpPr>
+            <a:cxnSpLocks noGrp="1" noRot="1" noChangeAspect="1" noMove="1" noResize="1" noEditPoints="1" noAdjustHandles="1" noChangeArrowheads="1" noChangeShapeType="1"/>
+          </p:cNvCxnSpPr>
+          <p:nvPr>
+            <p:extLst>
+              <p:ext uri="{386F3935-93C4-4BCD-93E2-E3B085C9AB24}">
+                <p16:designElem xmlns:p16="http://schemas.microsoft.com/office/powerpoint/2015/main" val="1"/>
+              </p:ext>
+            </p:extLst>
+          </p:nvPr>
+        </p:nvCxnSpPr>
+        <p:spPr>
+          <a:xfrm>
+            <a:off x="11586162" y="3610394"/>
+            <a:ext cx="0" cy="3238728"/>
+          </a:xfrm>
+          <a:prstGeom prst="line">
+            <a:avLst/>
+          </a:prstGeom>
+          <a:ln w="25400" cap="sq">
+            <a:gradFill flip="none" rotWithShape="1">
+              <a:gsLst>
+                <a:gs pos="0">
+                  <a:schemeClr val="accent2"/>
+                </a:gs>
+                <a:gs pos="100000">
+                  <a:schemeClr val="accent4"/>
+                </a:gs>
+              </a:gsLst>
+              <a:lin ang="16200000" scaled="1"/>
+              <a:tileRect/>
+            </a:gradFill>
+            <a:bevel/>
+          </a:ln>
+        </p:spPr>
+        <p:style>
+          <a:lnRef idx="1">
+            <a:schemeClr val="accent1"/>
+          </a:lnRef>
+          <a:fillRef idx="0">
+            <a:schemeClr val="accent1"/>
+          </a:fillRef>
+          <a:effectRef idx="0">
+            <a:schemeClr val="accent1"/>
+          </a:effectRef>
+          <a:fontRef idx="minor">
+            <a:schemeClr val="tx1"/>
+          </a:fontRef>
+        </p:style>
+      </p:cxnSp>
+    </p:spTree>
+    <p:extLst>
+      <p:ext uri="{BB962C8B-B14F-4D97-AF65-F5344CB8AC3E}">
+        <p14:creationId xmlns:p14="http://schemas.microsoft.com/office/powerpoint/2010/main" val="2204665515"/>
+      </p:ext>
+    </p:extLst>
+  </p:cSld>
+  <p:clrMapOvr>
+    <a:masterClrMapping/>
+  </p:clrMapOvr>
+</p:sld>
+</file>
+
+<file path=ppt/slides/slide7.xml><?xml version="1.0" encoding="utf-8"?>
+<p:sld xmlns:a="http://schemas.openxmlformats.org/drawingml/2006/main" xmlns:r="http://schemas.openxmlformats.org/officeDocument/2006/relationships" xmlns:p="http://schemas.openxmlformats.org/presentationml/2006/main">
+  <p:cSld>
+    <p:bg>
+      <p:bgPr>
+        <a:solidFill>
+          <a:schemeClr val="bg1"/>
+        </a:solidFill>
+        <a:effectLst/>
+      </p:bgPr>
+    </p:bg>
+    <p:spTree>
+      <p:nvGrpSpPr>
+        <p:cNvPr id="1" name=""/>
+        <p:cNvGrpSpPr/>
+        <p:nvPr/>
+      </p:nvGrpSpPr>
+      <p:grpSpPr>
+        <a:xfrm>
+          <a:off x="0" y="0"/>
+          <a:ext cx="0" cy="0"/>
+          <a:chOff x="0" y="0"/>
+          <a:chExt cx="0" cy="0"/>
+        </a:xfrm>
+      </p:grpSpPr>
+      <p:sp useBgFill="1">
+        <p:nvSpPr>
+          <p:cNvPr id="20" name="Rectangle 11">
+            <a:extLst>
+              <a:ext uri="{FF2B5EF4-FFF2-40B4-BE49-F238E27FC236}">
+                <a16:creationId xmlns:a16="http://schemas.microsoft.com/office/drawing/2014/main" id="{A2679492-7988-4050-9056-542444452411}"/>
+              </a:ext>
+              <a:ext uri="{C183D7F6-B498-43B3-948B-1728B52AA6E4}">
+                <adec:decorative xmlns:adec="http://schemas.microsoft.com/office/drawing/2017/decorative" val="1"/>
+              </a:ext>
+            </a:extLst>
+          </p:cNvPr>
+          <p:cNvSpPr>
+            <a:spLocks noGrp="1" noRot="1" noChangeAspect="1" noMove="1" noResize="1" noEditPoints="1" noAdjustHandles="1" noChangeArrowheads="1" noChangeShapeType="1" noTextEdit="1"/>
+          </p:cNvSpPr>
+          <p:nvPr>
+            <p:extLst>
+              <p:ext uri="{386F3935-93C4-4BCD-93E2-E3B085C9AB24}">
+                <p16:designElem xmlns:p16="http://schemas.microsoft.com/office/powerpoint/2015/main" val="1"/>
+              </p:ext>
+            </p:extLst>
+          </p:nvPr>
+        </p:nvSpPr>
+        <p:spPr>
+          <a:xfrm>
+            <a:off x="0" y="0"/>
+            <a:ext cx="12192000" cy="6858000"/>
+          </a:xfrm>
+          <a:prstGeom prst="rect">
+            <a:avLst/>
+          </a:prstGeom>
+          <a:ln>
+            <a:noFill/>
+          </a:ln>
+        </p:spPr>
+        <p:style>
+          <a:lnRef idx="2">
+            <a:schemeClr val="accent1">
+              <a:shade val="50000"/>
+            </a:schemeClr>
+          </a:lnRef>
+          <a:fillRef idx="1">
+            <a:schemeClr val="accent1"/>
+          </a:fillRef>
+          <a:effectRef idx="0">
+            <a:schemeClr val="accent1"/>
+          </a:effectRef>
+          <a:fontRef idx="minor">
+            <a:schemeClr val="lt1"/>
+          </a:fontRef>
+        </p:style>
+        <p:txBody>
+          <a:bodyPr rtlCol="0" anchor="ctr"/>
+          <a:lstStyle/>
+          <a:p>
+            <a:pPr algn="ctr"/>
+            <a:endParaRPr lang="en-US"/>
+          </a:p>
+        </p:txBody>
+      </p:sp>
+      <p:sp>
+        <p:nvSpPr>
+          <p:cNvPr id="2" name="Title 1">
+            <a:extLst>
+              <a:ext uri="{FF2B5EF4-FFF2-40B4-BE49-F238E27FC236}">
+                <a16:creationId xmlns:a16="http://schemas.microsoft.com/office/drawing/2014/main" id="{A50A5637-B46D-46EC-A7CB-2E6879D3AB39}"/>
+              </a:ext>
+            </a:extLst>
+          </p:cNvPr>
+          <p:cNvSpPr>
+            <a:spLocks noGrp="1"/>
+          </p:cNvSpPr>
+          <p:nvPr>
+            <p:ph type="title"/>
+          </p:nvPr>
+        </p:nvSpPr>
+        <p:spPr>
+          <a:xfrm>
+            <a:off x="6412091" y="501651"/>
+            <a:ext cx="4395340" cy="1716255"/>
+          </a:xfrm>
+        </p:spPr>
+        <p:txBody>
+          <a:bodyPr anchor="b">
+            <a:normAutofit/>
+          </a:bodyPr>
+          <a:lstStyle/>
+          <a:p>
+            <a:r>
+              <a:rPr lang="en-CA" sz="5000"/>
+              <a:t>Permission Base Authentication</a:t>
+            </a:r>
+          </a:p>
+        </p:txBody>
+      </p:sp>
+      <p:sp>
+        <p:nvSpPr>
+          <p:cNvPr id="21" name="Rectangle 13">
+            <a:extLst>
+              <a:ext uri="{FF2B5EF4-FFF2-40B4-BE49-F238E27FC236}">
+                <a16:creationId xmlns:a16="http://schemas.microsoft.com/office/drawing/2014/main" id="{B091B163-7D61-4891-ABCF-5C13D9C418D0}"/>
+              </a:ext>
+              <a:ext uri="{C183D7F6-B498-43B3-948B-1728B52AA6E4}">
+                <adec:decorative xmlns:adec="http://schemas.microsoft.com/office/drawing/2017/decorative" val="1"/>
+              </a:ext>
+            </a:extLst>
+          </p:cNvPr>
+          <p:cNvSpPr>
+            <a:spLocks noGrp="1" noRot="1" noChangeAspect="1" noMove="1" noResize="1" noEditPoints="1" noAdjustHandles="1" noChangeArrowheads="1" noChangeShapeType="1" noTextEdit="1"/>
+          </p:cNvSpPr>
+          <p:nvPr>
+            <p:extLst>
+              <p:ext uri="{386F3935-93C4-4BCD-93E2-E3B085C9AB24}">
+                <p16:designElem xmlns:p16="http://schemas.microsoft.com/office/powerpoint/2015/main" val="1"/>
+              </p:ext>
+            </p:extLst>
+          </p:nvPr>
+        </p:nvSpPr>
+        <p:spPr>
+          <a:xfrm>
+            <a:off x="0" y="0"/>
+            <a:ext cx="5779911" cy="6858000"/>
+          </a:xfrm>
+          <a:prstGeom prst="rect">
+            <a:avLst/>
+          </a:prstGeom>
+          <a:gradFill flip="none" rotWithShape="1">
+            <a:gsLst>
+              <a:gs pos="100000">
+                <a:schemeClr val="accent4"/>
+              </a:gs>
+              <a:gs pos="0">
+                <a:schemeClr val="accent2"/>
+              </a:gs>
+            </a:gsLst>
+            <a:lin ang="2700000" scaled="1"/>
+            <a:tileRect/>
+          </a:gradFill>
+          <a:ln>
+            <a:noFill/>
+          </a:ln>
+        </p:spPr>
+        <p:style>
+          <a:lnRef idx="2">
+            <a:schemeClr val="accent1">
+              <a:shade val="50000"/>
+            </a:schemeClr>
+          </a:lnRef>
+          <a:fillRef idx="1">
+            <a:schemeClr val="accent1"/>
+          </a:fillRef>
+          <a:effectRef idx="0">
+            <a:schemeClr val="accent1"/>
+          </a:effectRef>
+          <a:fontRef idx="minor">
+            <a:schemeClr val="lt1"/>
+          </a:fontRef>
+        </p:style>
+        <p:txBody>
+          <a:bodyPr rtlCol="0" anchor="ctr"/>
+          <a:lstStyle/>
+          <a:p>
+            <a:pPr algn="ctr"/>
+            <a:endParaRPr lang="en-US"/>
+          </a:p>
+        </p:txBody>
+      </p:sp>
+      <p:pic>
+        <p:nvPicPr>
+          <p:cNvPr id="5" name="Content Placeholder 4" descr="Text&#10;&#10;Description automatically generated">
+            <a:extLst>
+              <a:ext uri="{FF2B5EF4-FFF2-40B4-BE49-F238E27FC236}">
+                <a16:creationId xmlns:a16="http://schemas.microsoft.com/office/drawing/2014/main" id="{8B8D9184-8DD6-4411-827C-79629ADA02B1}"/>
+              </a:ext>
+            </a:extLst>
+          </p:cNvPr>
+          <p:cNvPicPr>
+            <a:picLocks noChangeAspect="1"/>
+          </p:cNvPicPr>
+          <p:nvPr/>
+        </p:nvPicPr>
+        <p:blipFill>
+          <a:blip r:embed="rId2">
+            <a:extLst>
+              <a:ext uri="{28A0092B-C50C-407E-A947-70E740481C1C}">
+                <a14:useLocalDpi xmlns:a14="http://schemas.microsoft.com/office/drawing/2010/main" val="0"/>
+              </a:ext>
+            </a:extLst>
+          </a:blip>
+          <a:stretch>
+            <a:fillRect/>
+          </a:stretch>
+        </p:blipFill>
+        <p:spPr>
+          <a:xfrm>
+            <a:off x="279143" y="2365094"/>
+            <a:ext cx="5221625" cy="2127812"/>
+          </a:xfrm>
+          <a:prstGeom prst="rect">
+            <a:avLst/>
+          </a:prstGeom>
+        </p:spPr>
+      </p:pic>
+      <p:sp>
+        <p:nvSpPr>
+          <p:cNvPr id="9" name="Content Placeholder 8">
+            <a:extLst>
+              <a:ext uri="{FF2B5EF4-FFF2-40B4-BE49-F238E27FC236}">
+                <a16:creationId xmlns:a16="http://schemas.microsoft.com/office/drawing/2014/main" id="{67EE14D4-F500-4D3D-8A0E-F71375A70591}"/>
+              </a:ext>
+            </a:extLst>
+          </p:cNvPr>
+          <p:cNvSpPr>
+            <a:spLocks noGrp="1"/>
+          </p:cNvSpPr>
+          <p:nvPr>
+            <p:ph idx="1"/>
+          </p:nvPr>
+        </p:nvSpPr>
+        <p:spPr>
+          <a:xfrm>
+            <a:off x="6392583" y="2645922"/>
+            <a:ext cx="4434721" cy="3710427"/>
+          </a:xfrm>
+        </p:spPr>
+        <p:txBody>
+          <a:bodyPr anchor="t">
+            <a:normAutofit/>
+          </a:bodyPr>
+          <a:lstStyle/>
+          <a:p>
+            <a:endParaRPr lang="en-US" sz="1800"/>
+          </a:p>
+        </p:txBody>
+      </p:sp>
+      <p:cxnSp>
+        <p:nvCxnSpPr>
+          <p:cNvPr id="22" name="Straight Connector 15">
+            <a:extLst>
+              <a:ext uri="{FF2B5EF4-FFF2-40B4-BE49-F238E27FC236}">
+                <a16:creationId xmlns:a16="http://schemas.microsoft.com/office/drawing/2014/main" id="{C49DA8F6-BCC1-4447-B54C-57856834B94B}"/>
+              </a:ext>
+              <a:ext uri="{C183D7F6-B498-43B3-948B-1728B52AA6E4}">
+                <adec:decorative xmlns:adec="http://schemas.microsoft.com/office/drawing/2017/decorative" val="1"/>
+              </a:ext>
+            </a:extLst>
+          </p:cNvPr>
+          <p:cNvCxnSpPr>
+            <a:cxnSpLocks noGrp="1" noRot="1" noChangeAspect="1" noMove="1" noResize="1" noEditPoints="1" noAdjustHandles="1" noChangeArrowheads="1" noChangeShapeType="1"/>
+          </p:cNvCxnSpPr>
+          <p:nvPr>
+            <p:extLst>
+              <p:ext uri="{386F3935-93C4-4BCD-93E2-E3B085C9AB24}">
+                <p16:designElem xmlns:p16="http://schemas.microsoft.com/office/powerpoint/2015/main" val="1"/>
+              </p:ext>
+            </p:extLst>
+          </p:nvPr>
+        </p:nvCxnSpPr>
+        <p:spPr>
+          <a:xfrm>
+            <a:off x="11586162" y="3610394"/>
+            <a:ext cx="0" cy="3238728"/>
+          </a:xfrm>
+          <a:prstGeom prst="line">
+            <a:avLst/>
+          </a:prstGeom>
+          <a:ln w="25400" cap="sq">
+            <a:gradFill flip="none" rotWithShape="1">
+              <a:gsLst>
+                <a:gs pos="0">
+                  <a:schemeClr val="accent2"/>
+                </a:gs>
+                <a:gs pos="100000">
+                  <a:schemeClr val="accent4"/>
+                </a:gs>
+              </a:gsLst>
+              <a:lin ang="16200000" scaled="1"/>
+              <a:tileRect/>
+            </a:gradFill>
+            <a:bevel/>
+          </a:ln>
+        </p:spPr>
+        <p:style>
+          <a:lnRef idx="1">
+            <a:schemeClr val="accent1"/>
+          </a:lnRef>
+          <a:fillRef idx="0">
+            <a:schemeClr val="accent1"/>
+          </a:fillRef>
+          <a:effectRef idx="0">
+            <a:schemeClr val="accent1"/>
+          </a:effectRef>
+          <a:fontRef idx="minor">
+            <a:schemeClr val="tx1"/>
+          </a:fontRef>
+        </p:style>
+      </p:cxnSp>
+    </p:spTree>
+    <p:extLst>
+      <p:ext uri="{BB962C8B-B14F-4D97-AF65-F5344CB8AC3E}">
+        <p14:creationId xmlns:p14="http://schemas.microsoft.com/office/powerpoint/2010/main" val="31030666"/>
+      </p:ext>
+    </p:extLst>
+  </p:cSld>
+  <p:clrMapOvr>
+    <a:masterClrMapping/>
+  </p:clrMapOvr>
+</p:sld>
+</file>
+
+<file path=ppt/slides/slide8.xml><?xml version="1.0" encoding="utf-8"?>
+<p:sld xmlns:a="http://schemas.openxmlformats.org/drawingml/2006/main" xmlns:r="http://schemas.openxmlformats.org/officeDocument/2006/relationships" xmlns:p="http://schemas.openxmlformats.org/presentationml/2006/main">
+  <p:cSld>
+    <p:bg>
+      <p:bgPr>
+        <a:solidFill>
+          <a:schemeClr val="bg1"/>
+        </a:solidFill>
+        <a:effectLst/>
+      </p:bgPr>
+    </p:bg>
+    <p:spTree>
+      <p:nvGrpSpPr>
+        <p:cNvPr id="1" name=""/>
+        <p:cNvGrpSpPr/>
+        <p:nvPr/>
+      </p:nvGrpSpPr>
+      <p:grpSpPr>
+        <a:xfrm>
+          <a:off x="0" y="0"/>
+          <a:ext cx="0" cy="0"/>
+          <a:chOff x="0" y="0"/>
+          <a:chExt cx="0" cy="0"/>
+        </a:xfrm>
+      </p:grpSpPr>
+      <p:sp useBgFill="1">
+        <p:nvSpPr>
+          <p:cNvPr id="17" name="Rectangle 13">
+            <a:extLst>
+              <a:ext uri="{FF2B5EF4-FFF2-40B4-BE49-F238E27FC236}">
+                <a16:creationId xmlns:a16="http://schemas.microsoft.com/office/drawing/2014/main" id="{A2679492-7988-4050-9056-542444452411}"/>
+              </a:ext>
+              <a:ext uri="{C183D7F6-B498-43B3-948B-1728B52AA6E4}">
+                <adec:decorative xmlns:adec="http://schemas.microsoft.com/office/drawing/2017/decorative" val="1"/>
+              </a:ext>
+            </a:extLst>
+          </p:cNvPr>
+          <p:cNvSpPr>
+            <a:spLocks noGrp="1" noRot="1" noChangeAspect="1" noMove="1" noResize="1" noEditPoints="1" noAdjustHandles="1" noChangeArrowheads="1" noChangeShapeType="1" noTextEdit="1"/>
+          </p:cNvSpPr>
+          <p:nvPr>
+            <p:extLst>
+              <p:ext uri="{386F3935-93C4-4BCD-93E2-E3B085C9AB24}">
+                <p16:designElem xmlns:p16="http://schemas.microsoft.com/office/powerpoint/2015/main" val="1"/>
+              </p:ext>
+            </p:extLst>
+          </p:nvPr>
+        </p:nvSpPr>
+        <p:spPr>
+          <a:xfrm>
+            <a:off x="0" y="0"/>
+            <a:ext cx="12192000" cy="6858000"/>
+          </a:xfrm>
+          <a:prstGeom prst="rect">
+            <a:avLst/>
+          </a:prstGeom>
+          <a:ln>
+            <a:noFill/>
+          </a:ln>
+        </p:spPr>
+        <p:style>
+          <a:lnRef idx="2">
+            <a:schemeClr val="accent1">
+              <a:shade val="50000"/>
+            </a:schemeClr>
+          </a:lnRef>
+          <a:fillRef idx="1">
+            <a:schemeClr val="accent1"/>
+          </a:fillRef>
+          <a:effectRef idx="0">
+            <a:schemeClr val="accent1"/>
+          </a:effectRef>
+          <a:fontRef idx="minor">
+            <a:schemeClr val="lt1"/>
+          </a:fontRef>
+        </p:style>
+        <p:txBody>
+          <a:bodyPr rtlCol="0" anchor="ctr"/>
+          <a:lstStyle/>
+          <a:p>
+            <a:pPr algn="ctr"/>
+            <a:endParaRPr lang="en-US"/>
+          </a:p>
+        </p:txBody>
+      </p:sp>
+      <p:sp>
+        <p:nvSpPr>
+          <p:cNvPr id="2" name="Title 1">
+            <a:extLst>
+              <a:ext uri="{FF2B5EF4-FFF2-40B4-BE49-F238E27FC236}">
+                <a16:creationId xmlns:a16="http://schemas.microsoft.com/office/drawing/2014/main" id="{61FFE60A-94D9-4EDF-998E-07AF0B969E67}"/>
+              </a:ext>
+            </a:extLst>
+          </p:cNvPr>
+          <p:cNvSpPr>
+            <a:spLocks noGrp="1"/>
+          </p:cNvSpPr>
+          <p:nvPr>
+            <p:ph type="title"/>
+          </p:nvPr>
+        </p:nvSpPr>
+        <p:spPr>
+          <a:xfrm>
+            <a:off x="6412091" y="501651"/>
+            <a:ext cx="4395340" cy="1716255"/>
+          </a:xfrm>
+        </p:spPr>
+        <p:txBody>
+          <a:bodyPr anchor="b">
+            <a:normAutofit/>
+          </a:bodyPr>
+          <a:lstStyle/>
+          <a:p>
+            <a:r>
+              <a:rPr lang="en-CA" sz="5400"/>
+              <a:t>Method Base Authentication</a:t>
+            </a:r>
+          </a:p>
+        </p:txBody>
+      </p:sp>
+      <p:sp>
+        <p:nvSpPr>
+          <p:cNvPr id="16" name="Rectangle 15">
+            <a:extLst>
+              <a:ext uri="{FF2B5EF4-FFF2-40B4-BE49-F238E27FC236}">
+                <a16:creationId xmlns:a16="http://schemas.microsoft.com/office/drawing/2014/main" id="{B091B163-7D61-4891-ABCF-5C13D9C418D0}"/>
+              </a:ext>
+              <a:ext uri="{C183D7F6-B498-43B3-948B-1728B52AA6E4}">
+                <adec:decorative xmlns:adec="http://schemas.microsoft.com/office/drawing/2017/decorative" val="1"/>
+              </a:ext>
+            </a:extLst>
+          </p:cNvPr>
+          <p:cNvSpPr>
+            <a:spLocks noGrp="1" noRot="1" noChangeAspect="1" noMove="1" noResize="1" noEditPoints="1" noAdjustHandles="1" noChangeArrowheads="1" noChangeShapeType="1" noTextEdit="1"/>
+          </p:cNvSpPr>
+          <p:nvPr>
+            <p:extLst>
+              <p:ext uri="{386F3935-93C4-4BCD-93E2-E3B085C9AB24}">
+                <p16:designElem xmlns:p16="http://schemas.microsoft.com/office/powerpoint/2015/main" val="1"/>
+              </p:ext>
+            </p:extLst>
+          </p:nvPr>
+        </p:nvSpPr>
+        <p:spPr>
+          <a:xfrm>
+            <a:off x="0" y="0"/>
+            <a:ext cx="5779911" cy="6858000"/>
+          </a:xfrm>
+          <a:prstGeom prst="rect">
+            <a:avLst/>
+          </a:prstGeom>
+          <a:gradFill flip="none" rotWithShape="1">
+            <a:gsLst>
+              <a:gs pos="100000">
+                <a:schemeClr val="accent4"/>
+              </a:gs>
+              <a:gs pos="0">
+                <a:schemeClr val="accent2"/>
+              </a:gs>
+            </a:gsLst>
+            <a:lin ang="2700000" scaled="1"/>
+            <a:tileRect/>
+          </a:gradFill>
+          <a:ln>
+            <a:noFill/>
+          </a:ln>
+        </p:spPr>
+        <p:style>
+          <a:lnRef idx="2">
+            <a:schemeClr val="accent1">
+              <a:shade val="50000"/>
+            </a:schemeClr>
+          </a:lnRef>
+          <a:fillRef idx="1">
+            <a:schemeClr val="accent1"/>
+          </a:fillRef>
+          <a:effectRef idx="0">
+            <a:schemeClr val="accent1"/>
+          </a:effectRef>
+          <a:fontRef idx="minor">
+            <a:schemeClr val="lt1"/>
+          </a:fontRef>
+        </p:style>
+        <p:txBody>
+          <a:bodyPr rtlCol="0" anchor="ctr"/>
+          <a:lstStyle/>
+          <a:p>
+            <a:pPr algn="ctr"/>
+            <a:endParaRPr lang="en-US"/>
+          </a:p>
+        </p:txBody>
+      </p:sp>
+      <p:pic>
+        <p:nvPicPr>
+          <p:cNvPr id="7" name="Content Placeholder 6" descr="Text&#10;&#10;Description automatically generated">
+            <a:extLst>
+              <a:ext uri="{FF2B5EF4-FFF2-40B4-BE49-F238E27FC236}">
+                <a16:creationId xmlns:a16="http://schemas.microsoft.com/office/drawing/2014/main" id="{F8835D21-C1CA-4D91-842F-8476FFFAEDA0}"/>
+              </a:ext>
+            </a:extLst>
+          </p:cNvPr>
+          <p:cNvPicPr>
+            <a:picLocks noChangeAspect="1"/>
+          </p:cNvPicPr>
+          <p:nvPr/>
+        </p:nvPicPr>
+        <p:blipFill>
+          <a:blip r:embed="rId2">
+            <a:extLst>
+              <a:ext uri="{28A0092B-C50C-407E-A947-70E740481C1C}">
+                <a14:useLocalDpi xmlns:a14="http://schemas.microsoft.com/office/drawing/2010/main" val="0"/>
+              </a:ext>
+            </a:extLst>
+          </a:blip>
+          <a:stretch>
+            <a:fillRect/>
+          </a:stretch>
+        </p:blipFill>
+        <p:spPr>
+          <a:xfrm>
+            <a:off x="279143" y="2567433"/>
+            <a:ext cx="5221625" cy="1723135"/>
+          </a:xfrm>
+          <a:prstGeom prst="rect">
+            <a:avLst/>
+          </a:prstGeom>
+        </p:spPr>
+      </p:pic>
+      <p:sp>
+        <p:nvSpPr>
+          <p:cNvPr id="11" name="Content Placeholder 10">
+            <a:extLst>
+              <a:ext uri="{FF2B5EF4-FFF2-40B4-BE49-F238E27FC236}">
+                <a16:creationId xmlns:a16="http://schemas.microsoft.com/office/drawing/2014/main" id="{6D7F15A3-2A69-44EE-96AE-43A866D82401}"/>
+              </a:ext>
+            </a:extLst>
+          </p:cNvPr>
+          <p:cNvSpPr>
+            <a:spLocks noGrp="1"/>
+          </p:cNvSpPr>
+          <p:nvPr>
+            <p:ph idx="1"/>
+          </p:nvPr>
+        </p:nvSpPr>
+        <p:spPr>
+          <a:xfrm>
+            <a:off x="6392583" y="2645922"/>
+            <a:ext cx="4434721" cy="3710427"/>
+          </a:xfrm>
+        </p:spPr>
+        <p:txBody>
+          <a:bodyPr anchor="t">
+            <a:normAutofit/>
+          </a:bodyPr>
+          <a:lstStyle/>
+          <a:p>
+            <a:endParaRPr lang="en-US" sz="1800" dirty="0"/>
+          </a:p>
+        </p:txBody>
+      </p:sp>
+      <p:cxnSp>
+        <p:nvCxnSpPr>
+          <p:cNvPr id="18" name="Straight Connector 17">
+            <a:extLst>
+              <a:ext uri="{FF2B5EF4-FFF2-40B4-BE49-F238E27FC236}">
+                <a16:creationId xmlns:a16="http://schemas.microsoft.com/office/drawing/2014/main" id="{C49DA8F6-BCC1-4447-B54C-57856834B94B}"/>
+              </a:ext>
+              <a:ext uri="{C183D7F6-B498-43B3-948B-1728B52AA6E4}">
+                <adec:decorative xmlns:adec="http://schemas.microsoft.com/office/drawing/2017/decorative" val="1"/>
+              </a:ext>
+            </a:extLst>
+          </p:cNvPr>
+          <p:cNvCxnSpPr>
+            <a:cxnSpLocks noGrp="1" noRot="1" noChangeAspect="1" noMove="1" noResize="1" noEditPoints="1" noAdjustHandles="1" noChangeArrowheads="1" noChangeShapeType="1"/>
+          </p:cNvCxnSpPr>
+          <p:nvPr>
+            <p:extLst>
+              <p:ext uri="{386F3935-93C4-4BCD-93E2-E3B085C9AB24}">
+                <p16:designElem xmlns:p16="http://schemas.microsoft.com/office/powerpoint/2015/main" val="1"/>
+              </p:ext>
+            </p:extLst>
+          </p:nvPr>
+        </p:nvCxnSpPr>
+        <p:spPr>
+          <a:xfrm>
+            <a:off x="11586162" y="3610394"/>
+            <a:ext cx="0" cy="3238728"/>
+          </a:xfrm>
+          <a:prstGeom prst="line">
+            <a:avLst/>
+          </a:prstGeom>
+          <a:ln w="25400" cap="sq">
+            <a:gradFill flip="none" rotWithShape="1">
+              <a:gsLst>
+                <a:gs pos="0">
+                  <a:schemeClr val="accent2"/>
+                </a:gs>
+                <a:gs pos="100000">
+                  <a:schemeClr val="accent4"/>
+                </a:gs>
+              </a:gsLst>
+              <a:lin ang="16200000" scaled="1"/>
+              <a:tileRect/>
+            </a:gradFill>
+            <a:bevel/>
+          </a:ln>
+        </p:spPr>
+        <p:style>
+          <a:lnRef idx="1">
+            <a:schemeClr val="accent1"/>
+          </a:lnRef>
+          <a:fillRef idx="0">
+            <a:schemeClr val="accent1"/>
+          </a:fillRef>
+          <a:effectRef idx="0">
+            <a:schemeClr val="accent1"/>
+          </a:effectRef>
+          <a:fontRef idx="minor">
+            <a:schemeClr val="tx1"/>
+          </a:fontRef>
+        </p:style>
+      </p:cxnSp>
+    </p:spTree>
+    <p:extLst>
+      <p:ext uri="{BB962C8B-B14F-4D97-AF65-F5344CB8AC3E}">
+        <p14:creationId xmlns:p14="http://schemas.microsoft.com/office/powerpoint/2010/main" val="3200567945"/>
+      </p:ext>
+    </p:extLst>
+  </p:cSld>
+  <p:clrMapOvr>
+    <a:masterClrMapping/>
+  </p:clrMapOvr>
+</p:sld>
+</file>
+
 <file path=ppt/theme/theme1.xml><?xml version="1.0" encoding="utf-8"?>
 <a:theme xmlns:a="http://schemas.openxmlformats.org/drawingml/2006/main" name="GradientVTI">
   <a:themeElements>

</xml_diff>